<commit_message>
Coloquei os valores de consenso na apresentação
</commit_message>
<xml_diff>
--- a/Documentos/Apresentação.pptx
+++ b/Documentos/Apresentação.pptx
@@ -1,33 +1,139 @@
 
 <file path=ppt/presentation.xml><?xml version="1.0" encoding="utf-8"?>
-<p:presentation xmlns:a="http://schemas.openxmlformats.org/drawingml/2006/main" xmlns:p="http://schemas.openxmlformats.org/presentationml/2006/main" xmlns:r="http://schemas.openxmlformats.org/officeDocument/2006/relationships" xmlns:p14="http://schemas.microsoft.com/office/powerpoint/2010/main" xmlns:p15="http://schemas.microsoft.com/office/powerpoint/2012/main" xmlns:mc="http://schemas.openxmlformats.org/markup-compatibility/2006">
+<p:presentation xmlns:a="http://schemas.openxmlformats.org/drawingml/2006/main" xmlns:r="http://schemas.openxmlformats.org/officeDocument/2006/relationships" xmlns:p="http://schemas.openxmlformats.org/presentationml/2006/main">
   <p:sldMasterIdLst>
-    <p:sldMasterId id="2147483648" r:id="rId2"/>
+    <p:sldMasterId id="2147483648" r:id="rId1"/>
   </p:sldMasterIdLst>
   <p:sldIdLst>
-    <p:sldId id="256" r:id="rId3"/>
-    <p:sldId id="257" r:id="rId4"/>
-    <p:sldId id="258" r:id="rId5"/>
-    <p:sldId id="259" r:id="rId6"/>
-    <p:sldId id="260" r:id="rId7"/>
-    <p:sldId id="261" r:id="rId8"/>
-    <p:sldId id="262" r:id="rId9"/>
-    <p:sldId id="263" r:id="rId10"/>
-    <p:sldId id="264" r:id="rId11"/>
-    <p:sldId id="265" r:id="rId12"/>
-    <p:sldId id="266" r:id="rId13"/>
-    <p:sldId id="267" r:id="rId14"/>
-    <p:sldId id="268" r:id="rId15"/>
-    <p:sldId id="269" r:id="rId16"/>
-    <p:sldId id="270" r:id="rId17"/>
+    <p:sldId id="256" r:id="rId2"/>
+    <p:sldId id="257" r:id="rId3"/>
+    <p:sldId id="258" r:id="rId4"/>
+    <p:sldId id="259" r:id="rId5"/>
+    <p:sldId id="260" r:id="rId6"/>
+    <p:sldId id="261" r:id="rId7"/>
+    <p:sldId id="262" r:id="rId8"/>
+    <p:sldId id="263" r:id="rId9"/>
+    <p:sldId id="264" r:id="rId10"/>
+    <p:sldId id="265" r:id="rId11"/>
+    <p:sldId id="266" r:id="rId12"/>
+    <p:sldId id="267" r:id="rId13"/>
+    <p:sldId id="268" r:id="rId14"/>
+    <p:sldId id="269" r:id="rId15"/>
+    <p:sldId id="270" r:id="rId16"/>
   </p:sldIdLst>
-  <p:sldSz cx="9144000" cy="6858000"/>
-  <p:notesSz cx="7559675" cy="10691812"/>
+  <p:sldSz cx="9144000" cy="6858000" type="screen4x3"/>
+  <p:notesSz cx="7559675" cy="10691813"/>
+  <p:defaultTextStyle>
+    <a:defPPr>
+      <a:defRPr lang="pt-BR"/>
+    </a:defPPr>
+    <a:lvl1pPr marL="0" algn="l" defTabSz="914400" rtl="0" eaLnBrk="1" latinLnBrk="0" hangingPunct="1">
+      <a:defRPr sz="1800" kern="1200">
+        <a:solidFill>
+          <a:schemeClr val="tx1"/>
+        </a:solidFill>
+        <a:latin typeface="+mn-lt"/>
+        <a:ea typeface="+mn-ea"/>
+        <a:cs typeface="+mn-cs"/>
+      </a:defRPr>
+    </a:lvl1pPr>
+    <a:lvl2pPr marL="457200" algn="l" defTabSz="914400" rtl="0" eaLnBrk="1" latinLnBrk="0" hangingPunct="1">
+      <a:defRPr sz="1800" kern="1200">
+        <a:solidFill>
+          <a:schemeClr val="tx1"/>
+        </a:solidFill>
+        <a:latin typeface="+mn-lt"/>
+        <a:ea typeface="+mn-ea"/>
+        <a:cs typeface="+mn-cs"/>
+      </a:defRPr>
+    </a:lvl2pPr>
+    <a:lvl3pPr marL="914400" algn="l" defTabSz="914400" rtl="0" eaLnBrk="1" latinLnBrk="0" hangingPunct="1">
+      <a:defRPr sz="1800" kern="1200">
+        <a:solidFill>
+          <a:schemeClr val="tx1"/>
+        </a:solidFill>
+        <a:latin typeface="+mn-lt"/>
+        <a:ea typeface="+mn-ea"/>
+        <a:cs typeface="+mn-cs"/>
+      </a:defRPr>
+    </a:lvl3pPr>
+    <a:lvl4pPr marL="1371600" algn="l" defTabSz="914400" rtl="0" eaLnBrk="1" latinLnBrk="0" hangingPunct="1">
+      <a:defRPr sz="1800" kern="1200">
+        <a:solidFill>
+          <a:schemeClr val="tx1"/>
+        </a:solidFill>
+        <a:latin typeface="+mn-lt"/>
+        <a:ea typeface="+mn-ea"/>
+        <a:cs typeface="+mn-cs"/>
+      </a:defRPr>
+    </a:lvl4pPr>
+    <a:lvl5pPr marL="1828800" algn="l" defTabSz="914400" rtl="0" eaLnBrk="1" latinLnBrk="0" hangingPunct="1">
+      <a:defRPr sz="1800" kern="1200">
+        <a:solidFill>
+          <a:schemeClr val="tx1"/>
+        </a:solidFill>
+        <a:latin typeface="+mn-lt"/>
+        <a:ea typeface="+mn-ea"/>
+        <a:cs typeface="+mn-cs"/>
+      </a:defRPr>
+    </a:lvl5pPr>
+    <a:lvl6pPr marL="2286000" algn="l" defTabSz="914400" rtl="0" eaLnBrk="1" latinLnBrk="0" hangingPunct="1">
+      <a:defRPr sz="1800" kern="1200">
+        <a:solidFill>
+          <a:schemeClr val="tx1"/>
+        </a:solidFill>
+        <a:latin typeface="+mn-lt"/>
+        <a:ea typeface="+mn-ea"/>
+        <a:cs typeface="+mn-cs"/>
+      </a:defRPr>
+    </a:lvl6pPr>
+    <a:lvl7pPr marL="2743200" algn="l" defTabSz="914400" rtl="0" eaLnBrk="1" latinLnBrk="0" hangingPunct="1">
+      <a:defRPr sz="1800" kern="1200">
+        <a:solidFill>
+          <a:schemeClr val="tx1"/>
+        </a:solidFill>
+        <a:latin typeface="+mn-lt"/>
+        <a:ea typeface="+mn-ea"/>
+        <a:cs typeface="+mn-cs"/>
+      </a:defRPr>
+    </a:lvl7pPr>
+    <a:lvl8pPr marL="3200400" algn="l" defTabSz="914400" rtl="0" eaLnBrk="1" latinLnBrk="0" hangingPunct="1">
+      <a:defRPr sz="1800" kern="1200">
+        <a:solidFill>
+          <a:schemeClr val="tx1"/>
+        </a:solidFill>
+        <a:latin typeface="+mn-lt"/>
+        <a:ea typeface="+mn-ea"/>
+        <a:cs typeface="+mn-cs"/>
+      </a:defRPr>
+    </a:lvl8pPr>
+    <a:lvl9pPr marL="3657600" algn="l" defTabSz="914400" rtl="0" eaLnBrk="1" latinLnBrk="0" hangingPunct="1">
+      <a:defRPr sz="1800" kern="1200">
+        <a:solidFill>
+          <a:schemeClr val="tx1"/>
+        </a:solidFill>
+        <a:latin typeface="+mn-lt"/>
+        <a:ea typeface="+mn-ea"/>
+        <a:cs typeface="+mn-cs"/>
+      </a:defRPr>
+    </a:lvl9pPr>
+  </p:defaultTextStyle>
+  <p:extLst>
+    <p:ext uri="{EFAFB233-063F-42B5-8137-9DF3F51BA10A}">
+      <p15:sldGuideLst xmlns:p15="http://schemas.microsoft.com/office/powerpoint/2012/main">
+        <p15:guide id="1" pos="2880" userDrawn="1">
+          <p15:clr>
+            <a:srgbClr val="A4A3A4"/>
+          </p15:clr>
+        </p15:guide>
+      </p15:sldGuideLst>
+    </p:ext>
+  </p:extLst>
 </p:presentation>
 </file>
 
 <file path=ppt/slideLayouts/slideLayout1.xml><?xml version="1.0" encoding="utf-8"?>
-<p:sldLayout xmlns:a="http://schemas.openxmlformats.org/drawingml/2006/main" xmlns:p="http://schemas.openxmlformats.org/presentationml/2006/main" xmlns:r="http://schemas.openxmlformats.org/officeDocument/2006/relationships" xmlns:p14="http://schemas.microsoft.com/office/powerpoint/2010/main" xmlns:p15="http://schemas.microsoft.com/office/powerpoint/2012/main" xmlns:mc="http://schemas.openxmlformats.org/markup-compatibility/2006" type="blank" preserve="1">
+<p:sldLayout xmlns:a="http://schemas.openxmlformats.org/drawingml/2006/main" xmlns:r="http://schemas.openxmlformats.org/officeDocument/2006/relationships" xmlns:p="http://schemas.openxmlformats.org/presentationml/2006/main" type="blank" preserve="1">
   <p:cSld name="Blank Slide">
     <p:spTree>
       <p:nvGrpSpPr>
@@ -45,11 +151,14 @@
       </p:grpSpPr>
     </p:spTree>
   </p:cSld>
+  <p:clrMapOvr>
+    <a:masterClrMapping/>
+  </p:clrMapOvr>
 </p:sldLayout>
 </file>
 
 <file path=ppt/slideLayouts/slideLayout10.xml><?xml version="1.0" encoding="utf-8"?>
-<p:sldLayout xmlns:a="http://schemas.openxmlformats.org/drawingml/2006/main" xmlns:p="http://schemas.openxmlformats.org/presentationml/2006/main" xmlns:r="http://schemas.openxmlformats.org/officeDocument/2006/relationships" xmlns:p14="http://schemas.microsoft.com/office/powerpoint/2010/main" xmlns:p15="http://schemas.microsoft.com/office/powerpoint/2012/main" xmlns:mc="http://schemas.openxmlformats.org/markup-compatibility/2006" type="objOverTx" preserve="1">
+<p:sldLayout xmlns:a="http://schemas.openxmlformats.org/drawingml/2006/main" xmlns:r="http://schemas.openxmlformats.org/officeDocument/2006/relationships" xmlns:p="http://schemas.openxmlformats.org/presentationml/2006/main" type="objOverTx" preserve="1">
   <p:cSld name="Title, Content over Content">
     <p:spTree>
       <p:nvGrpSpPr>
@@ -85,9 +194,10 @@
           </a:prstGeom>
         </p:spPr>
         <p:txBody>
-          <a:bodyPr lIns="0" rIns="0" tIns="0" bIns="0" anchor="ctr"/>
-          <a:p>
-            <a:endParaRPr b="0" lang="pt-BR" sz="1800" spc="-1" strike="noStrike">
+          <a:bodyPr lIns="0" tIns="0" rIns="0" bIns="0" anchor="ctr"/>
+          <a:lstStyle/>
+          <a:p>
+            <a:endParaRPr lang="pt-BR" sz="1800" b="0" strike="noStrike" spc="-1">
               <a:solidFill>
                 <a:srgbClr val="000000"/>
               </a:solidFill>
@@ -116,11 +226,12 @@
           </a:prstGeom>
         </p:spPr>
         <p:txBody>
-          <a:bodyPr lIns="0" rIns="0" tIns="0" bIns="0">
+          <a:bodyPr lIns="0" tIns="0" rIns="0" bIns="0">
             <a:normAutofit/>
           </a:bodyPr>
-          <a:p>
-            <a:endParaRPr b="0" lang="pt-BR" sz="3200" spc="-1" strike="noStrike">
+          <a:lstStyle/>
+          <a:p>
+            <a:endParaRPr lang="pt-BR" sz="3200" b="0" strike="noStrike" spc="-1">
               <a:solidFill>
                 <a:srgbClr val="000000"/>
               </a:solidFill>
@@ -149,11 +260,12 @@
           </a:prstGeom>
         </p:spPr>
         <p:txBody>
-          <a:bodyPr lIns="0" rIns="0" tIns="0" bIns="0">
+          <a:bodyPr lIns="0" tIns="0" rIns="0" bIns="0">
             <a:normAutofit/>
           </a:bodyPr>
-          <a:p>
-            <a:endParaRPr b="0" lang="pt-BR" sz="3200" spc="-1" strike="noStrike">
+          <a:lstStyle/>
+          <a:p>
+            <a:endParaRPr lang="pt-BR" sz="3200" b="0" strike="noStrike" spc="-1">
               <a:solidFill>
                 <a:srgbClr val="000000"/>
               </a:solidFill>
@@ -164,11 +276,14 @@
       </p:sp>
     </p:spTree>
   </p:cSld>
+  <p:clrMapOvr>
+    <a:masterClrMapping/>
+  </p:clrMapOvr>
 </p:sldLayout>
 </file>
 
 <file path=ppt/slideLayouts/slideLayout11.xml><?xml version="1.0" encoding="utf-8"?>
-<p:sldLayout xmlns:a="http://schemas.openxmlformats.org/drawingml/2006/main" xmlns:p="http://schemas.openxmlformats.org/presentationml/2006/main" xmlns:r="http://schemas.openxmlformats.org/officeDocument/2006/relationships" xmlns:p14="http://schemas.microsoft.com/office/powerpoint/2010/main" xmlns:p15="http://schemas.microsoft.com/office/powerpoint/2012/main" xmlns:mc="http://schemas.openxmlformats.org/markup-compatibility/2006" type="fourObj" preserve="1">
+<p:sldLayout xmlns:a="http://schemas.openxmlformats.org/drawingml/2006/main" xmlns:r="http://schemas.openxmlformats.org/officeDocument/2006/relationships" xmlns:p="http://schemas.openxmlformats.org/presentationml/2006/main" type="fourObj" preserve="1">
   <p:cSld name="Title, 4 Content">
     <p:spTree>
       <p:nvGrpSpPr>
@@ -204,9 +319,10 @@
           </a:prstGeom>
         </p:spPr>
         <p:txBody>
-          <a:bodyPr lIns="0" rIns="0" tIns="0" bIns="0" anchor="ctr"/>
-          <a:p>
-            <a:endParaRPr b="0" lang="pt-BR" sz="1800" spc="-1" strike="noStrike">
+          <a:bodyPr lIns="0" tIns="0" rIns="0" bIns="0" anchor="ctr"/>
+          <a:lstStyle/>
+          <a:p>
+            <a:endParaRPr lang="pt-BR" sz="1800" b="0" strike="noStrike" spc="-1">
               <a:solidFill>
                 <a:srgbClr val="000000"/>
               </a:solidFill>
@@ -235,11 +351,12 @@
           </a:prstGeom>
         </p:spPr>
         <p:txBody>
-          <a:bodyPr lIns="0" rIns="0" tIns="0" bIns="0">
+          <a:bodyPr lIns="0" tIns="0" rIns="0" bIns="0">
             <a:normAutofit/>
           </a:bodyPr>
-          <a:p>
-            <a:endParaRPr b="0" lang="pt-BR" sz="3200" spc="-1" strike="noStrike">
+          <a:lstStyle/>
+          <a:p>
+            <a:endParaRPr lang="pt-BR" sz="3200" b="0" strike="noStrike" spc="-1">
               <a:solidFill>
                 <a:srgbClr val="000000"/>
               </a:solidFill>
@@ -268,11 +385,12 @@
           </a:prstGeom>
         </p:spPr>
         <p:txBody>
-          <a:bodyPr lIns="0" rIns="0" tIns="0" bIns="0">
+          <a:bodyPr lIns="0" tIns="0" rIns="0" bIns="0">
             <a:normAutofit/>
           </a:bodyPr>
-          <a:p>
-            <a:endParaRPr b="0" lang="pt-BR" sz="3200" spc="-1" strike="noStrike">
+          <a:lstStyle/>
+          <a:p>
+            <a:endParaRPr lang="pt-BR" sz="3200" b="0" strike="noStrike" spc="-1">
               <a:solidFill>
                 <a:srgbClr val="000000"/>
               </a:solidFill>
@@ -301,11 +419,12 @@
           </a:prstGeom>
         </p:spPr>
         <p:txBody>
-          <a:bodyPr lIns="0" rIns="0" tIns="0" bIns="0">
+          <a:bodyPr lIns="0" tIns="0" rIns="0" bIns="0">
             <a:normAutofit/>
           </a:bodyPr>
-          <a:p>
-            <a:endParaRPr b="0" lang="pt-BR" sz="3200" spc="-1" strike="noStrike">
+          <a:lstStyle/>
+          <a:p>
+            <a:endParaRPr lang="pt-BR" sz="3200" b="0" strike="noStrike" spc="-1">
               <a:solidFill>
                 <a:srgbClr val="000000"/>
               </a:solidFill>
@@ -334,11 +453,12 @@
           </a:prstGeom>
         </p:spPr>
         <p:txBody>
-          <a:bodyPr lIns="0" rIns="0" tIns="0" bIns="0">
+          <a:bodyPr lIns="0" tIns="0" rIns="0" bIns="0">
             <a:normAutofit/>
           </a:bodyPr>
-          <a:p>
-            <a:endParaRPr b="0" lang="pt-BR" sz="3200" spc="-1" strike="noStrike">
+          <a:lstStyle/>
+          <a:p>
+            <a:endParaRPr lang="pt-BR" sz="3200" b="0" strike="noStrike" spc="-1">
               <a:solidFill>
                 <a:srgbClr val="000000"/>
               </a:solidFill>
@@ -349,11 +469,14 @@
       </p:sp>
     </p:spTree>
   </p:cSld>
+  <p:clrMapOvr>
+    <a:masterClrMapping/>
+  </p:clrMapOvr>
 </p:sldLayout>
 </file>
 
 <file path=ppt/slideLayouts/slideLayout12.xml><?xml version="1.0" encoding="utf-8"?>
-<p:sldLayout xmlns:a="http://schemas.openxmlformats.org/drawingml/2006/main" xmlns:p="http://schemas.openxmlformats.org/presentationml/2006/main" xmlns:r="http://schemas.openxmlformats.org/officeDocument/2006/relationships" xmlns:p14="http://schemas.microsoft.com/office/powerpoint/2010/main" xmlns:p15="http://schemas.microsoft.com/office/powerpoint/2012/main" xmlns:mc="http://schemas.openxmlformats.org/markup-compatibility/2006" type="blank" preserve="1">
+<p:sldLayout xmlns:a="http://schemas.openxmlformats.org/drawingml/2006/main" xmlns:r="http://schemas.openxmlformats.org/officeDocument/2006/relationships" xmlns:p="http://schemas.openxmlformats.org/presentationml/2006/main" type="blank" preserve="1">
   <p:cSld name="Title, 6 Content">
     <p:spTree>
       <p:nvGrpSpPr>
@@ -389,9 +512,10 @@
           </a:prstGeom>
         </p:spPr>
         <p:txBody>
-          <a:bodyPr lIns="0" rIns="0" tIns="0" bIns="0" anchor="ctr"/>
-          <a:p>
-            <a:endParaRPr b="0" lang="pt-BR" sz="1800" spc="-1" strike="noStrike">
+          <a:bodyPr lIns="0" tIns="0" rIns="0" bIns="0" anchor="ctr"/>
+          <a:lstStyle/>
+          <a:p>
+            <a:endParaRPr lang="pt-BR" sz="1800" b="0" strike="noStrike" spc="-1">
               <a:solidFill>
                 <a:srgbClr val="000000"/>
               </a:solidFill>
@@ -420,11 +544,12 @@
           </a:prstGeom>
         </p:spPr>
         <p:txBody>
-          <a:bodyPr lIns="0" rIns="0" tIns="0" bIns="0">
+          <a:bodyPr lIns="0" tIns="0" rIns="0" bIns="0">
             <a:normAutofit/>
           </a:bodyPr>
-          <a:p>
-            <a:endParaRPr b="0" lang="pt-BR" sz="3200" spc="-1" strike="noStrike">
+          <a:lstStyle/>
+          <a:p>
+            <a:endParaRPr lang="pt-BR" sz="3200" b="0" strike="noStrike" spc="-1">
               <a:solidFill>
                 <a:srgbClr val="000000"/>
               </a:solidFill>
@@ -453,11 +578,12 @@
           </a:prstGeom>
         </p:spPr>
         <p:txBody>
-          <a:bodyPr lIns="0" rIns="0" tIns="0" bIns="0">
+          <a:bodyPr lIns="0" tIns="0" rIns="0" bIns="0">
             <a:normAutofit/>
           </a:bodyPr>
-          <a:p>
-            <a:endParaRPr b="0" lang="pt-BR" sz="3200" spc="-1" strike="noStrike">
+          <a:lstStyle/>
+          <a:p>
+            <a:endParaRPr lang="pt-BR" sz="3200" b="0" strike="noStrike" spc="-1">
               <a:solidFill>
                 <a:srgbClr val="000000"/>
               </a:solidFill>
@@ -486,11 +612,12 @@
           </a:prstGeom>
         </p:spPr>
         <p:txBody>
-          <a:bodyPr lIns="0" rIns="0" tIns="0" bIns="0">
+          <a:bodyPr lIns="0" tIns="0" rIns="0" bIns="0">
             <a:normAutofit/>
           </a:bodyPr>
-          <a:p>
-            <a:endParaRPr b="0" lang="pt-BR" sz="3200" spc="-1" strike="noStrike">
+          <a:lstStyle/>
+          <a:p>
+            <a:endParaRPr lang="pt-BR" sz="3200" b="0" strike="noStrike" spc="-1">
               <a:solidFill>
                 <a:srgbClr val="000000"/>
               </a:solidFill>
@@ -519,11 +646,12 @@
           </a:prstGeom>
         </p:spPr>
         <p:txBody>
-          <a:bodyPr lIns="0" rIns="0" tIns="0" bIns="0">
+          <a:bodyPr lIns="0" tIns="0" rIns="0" bIns="0">
             <a:normAutofit/>
           </a:bodyPr>
-          <a:p>
-            <a:endParaRPr b="0" lang="pt-BR" sz="3200" spc="-1" strike="noStrike">
+          <a:lstStyle/>
+          <a:p>
+            <a:endParaRPr lang="pt-BR" sz="3200" b="0" strike="noStrike" spc="-1">
               <a:solidFill>
                 <a:srgbClr val="000000"/>
               </a:solidFill>
@@ -552,11 +680,12 @@
           </a:prstGeom>
         </p:spPr>
         <p:txBody>
-          <a:bodyPr lIns="0" rIns="0" tIns="0" bIns="0">
+          <a:bodyPr lIns="0" tIns="0" rIns="0" bIns="0">
             <a:normAutofit/>
           </a:bodyPr>
-          <a:p>
-            <a:endParaRPr b="0" lang="pt-BR" sz="3200" spc="-1" strike="noStrike">
+          <a:lstStyle/>
+          <a:p>
+            <a:endParaRPr lang="pt-BR" sz="3200" b="0" strike="noStrike" spc="-1">
               <a:solidFill>
                 <a:srgbClr val="000000"/>
               </a:solidFill>
@@ -585,11 +714,12 @@
           </a:prstGeom>
         </p:spPr>
         <p:txBody>
-          <a:bodyPr lIns="0" rIns="0" tIns="0" bIns="0">
+          <a:bodyPr lIns="0" tIns="0" rIns="0" bIns="0">
             <a:normAutofit/>
           </a:bodyPr>
-          <a:p>
-            <a:endParaRPr b="0" lang="pt-BR" sz="3200" spc="-1" strike="noStrike">
+          <a:lstStyle/>
+          <a:p>
+            <a:endParaRPr lang="pt-BR" sz="3200" b="0" strike="noStrike" spc="-1">
               <a:solidFill>
                 <a:srgbClr val="000000"/>
               </a:solidFill>
@@ -600,11 +730,14 @@
       </p:sp>
     </p:spTree>
   </p:cSld>
+  <p:clrMapOvr>
+    <a:masterClrMapping/>
+  </p:clrMapOvr>
 </p:sldLayout>
 </file>
 
 <file path=ppt/slideLayouts/slideLayout2.xml><?xml version="1.0" encoding="utf-8"?>
-<p:sldLayout xmlns:a="http://schemas.openxmlformats.org/drawingml/2006/main" xmlns:p="http://schemas.openxmlformats.org/presentationml/2006/main" xmlns:r="http://schemas.openxmlformats.org/officeDocument/2006/relationships" xmlns:p14="http://schemas.microsoft.com/office/powerpoint/2010/main" xmlns:p15="http://schemas.microsoft.com/office/powerpoint/2012/main" xmlns:mc="http://schemas.openxmlformats.org/markup-compatibility/2006" type="tx" preserve="1">
+<p:sldLayout xmlns:a="http://schemas.openxmlformats.org/drawingml/2006/main" xmlns:r="http://schemas.openxmlformats.org/officeDocument/2006/relationships" xmlns:p="http://schemas.openxmlformats.org/presentationml/2006/main" type="tx" preserve="1">
   <p:cSld name="Title Slide">
     <p:spTree>
       <p:nvGrpSpPr>
@@ -640,9 +773,10 @@
           </a:prstGeom>
         </p:spPr>
         <p:txBody>
-          <a:bodyPr lIns="0" rIns="0" tIns="0" bIns="0" anchor="ctr"/>
-          <a:p>
-            <a:endParaRPr b="0" lang="pt-BR" sz="1800" spc="-1" strike="noStrike">
+          <a:bodyPr lIns="0" tIns="0" rIns="0" bIns="0" anchor="ctr"/>
+          <a:lstStyle/>
+          <a:p>
+            <a:endParaRPr lang="pt-BR" sz="1800" b="0" strike="noStrike" spc="-1">
               <a:solidFill>
                 <a:srgbClr val="000000"/>
               </a:solidFill>
@@ -671,10 +805,11 @@
           </a:prstGeom>
         </p:spPr>
         <p:txBody>
-          <a:bodyPr lIns="0" rIns="0" tIns="0" bIns="0" anchor="ctr"/>
+          <a:bodyPr lIns="0" tIns="0" rIns="0" bIns="0" anchor="ctr"/>
+          <a:lstStyle/>
           <a:p>
             <a:pPr algn="ctr"/>
-            <a:endParaRPr b="0" lang="pt-BR" sz="3200" spc="-1" strike="noStrike">
+            <a:endParaRPr lang="pt-BR" sz="3200" b="0" strike="noStrike" spc="-1">
               <a:latin typeface="Arial"/>
             </a:endParaRPr>
           </a:p>
@@ -682,11 +817,14 @@
       </p:sp>
     </p:spTree>
   </p:cSld>
+  <p:clrMapOvr>
+    <a:masterClrMapping/>
+  </p:clrMapOvr>
 </p:sldLayout>
 </file>
 
 <file path=ppt/slideLayouts/slideLayout3.xml><?xml version="1.0" encoding="utf-8"?>
-<p:sldLayout xmlns:a="http://schemas.openxmlformats.org/drawingml/2006/main" xmlns:p="http://schemas.openxmlformats.org/presentationml/2006/main" xmlns:r="http://schemas.openxmlformats.org/officeDocument/2006/relationships" xmlns:p14="http://schemas.microsoft.com/office/powerpoint/2010/main" xmlns:p15="http://schemas.microsoft.com/office/powerpoint/2012/main" xmlns:mc="http://schemas.openxmlformats.org/markup-compatibility/2006" type="obj" preserve="1">
+<p:sldLayout xmlns:a="http://schemas.openxmlformats.org/drawingml/2006/main" xmlns:r="http://schemas.openxmlformats.org/officeDocument/2006/relationships" xmlns:p="http://schemas.openxmlformats.org/presentationml/2006/main" type="obj" preserve="1">
   <p:cSld name="Title, Content">
     <p:spTree>
       <p:nvGrpSpPr>
@@ -722,9 +860,10 @@
           </a:prstGeom>
         </p:spPr>
         <p:txBody>
-          <a:bodyPr lIns="0" rIns="0" tIns="0" bIns="0" anchor="ctr"/>
-          <a:p>
-            <a:endParaRPr b="0" lang="pt-BR" sz="1800" spc="-1" strike="noStrike">
+          <a:bodyPr lIns="0" tIns="0" rIns="0" bIns="0" anchor="ctr"/>
+          <a:lstStyle/>
+          <a:p>
+            <a:endParaRPr lang="pt-BR" sz="1800" b="0" strike="noStrike" spc="-1">
               <a:solidFill>
                 <a:srgbClr val="000000"/>
               </a:solidFill>
@@ -753,11 +892,12 @@
           </a:prstGeom>
         </p:spPr>
         <p:txBody>
-          <a:bodyPr lIns="0" rIns="0" tIns="0" bIns="0">
+          <a:bodyPr lIns="0" tIns="0" rIns="0" bIns="0">
             <a:normAutofit/>
           </a:bodyPr>
-          <a:p>
-            <a:endParaRPr b="0" lang="pt-BR" sz="3200" spc="-1" strike="noStrike">
+          <a:lstStyle/>
+          <a:p>
+            <a:endParaRPr lang="pt-BR" sz="3200" b="0" strike="noStrike" spc="-1">
               <a:solidFill>
                 <a:srgbClr val="000000"/>
               </a:solidFill>
@@ -768,11 +908,14 @@
       </p:sp>
     </p:spTree>
   </p:cSld>
+  <p:clrMapOvr>
+    <a:masterClrMapping/>
+  </p:clrMapOvr>
 </p:sldLayout>
 </file>
 
 <file path=ppt/slideLayouts/slideLayout4.xml><?xml version="1.0" encoding="utf-8"?>
-<p:sldLayout xmlns:a="http://schemas.openxmlformats.org/drawingml/2006/main" xmlns:p="http://schemas.openxmlformats.org/presentationml/2006/main" xmlns:r="http://schemas.openxmlformats.org/officeDocument/2006/relationships" xmlns:p14="http://schemas.microsoft.com/office/powerpoint/2010/main" xmlns:p15="http://schemas.microsoft.com/office/powerpoint/2012/main" xmlns:mc="http://schemas.openxmlformats.org/markup-compatibility/2006" type="twoObj" preserve="1">
+<p:sldLayout xmlns:a="http://schemas.openxmlformats.org/drawingml/2006/main" xmlns:r="http://schemas.openxmlformats.org/officeDocument/2006/relationships" xmlns:p="http://schemas.openxmlformats.org/presentationml/2006/main" type="twoObj" preserve="1">
   <p:cSld name="Title, 2 Content">
     <p:spTree>
       <p:nvGrpSpPr>
@@ -808,9 +951,10 @@
           </a:prstGeom>
         </p:spPr>
         <p:txBody>
-          <a:bodyPr lIns="0" rIns="0" tIns="0" bIns="0" anchor="ctr"/>
-          <a:p>
-            <a:endParaRPr b="0" lang="pt-BR" sz="1800" spc="-1" strike="noStrike">
+          <a:bodyPr lIns="0" tIns="0" rIns="0" bIns="0" anchor="ctr"/>
+          <a:lstStyle/>
+          <a:p>
+            <a:endParaRPr lang="pt-BR" sz="1800" b="0" strike="noStrike" spc="-1">
               <a:solidFill>
                 <a:srgbClr val="000000"/>
               </a:solidFill>
@@ -839,11 +983,12 @@
           </a:prstGeom>
         </p:spPr>
         <p:txBody>
-          <a:bodyPr lIns="0" rIns="0" tIns="0" bIns="0">
+          <a:bodyPr lIns="0" tIns="0" rIns="0" bIns="0">
             <a:normAutofit/>
           </a:bodyPr>
-          <a:p>
-            <a:endParaRPr b="0" lang="pt-BR" sz="3200" spc="-1" strike="noStrike">
+          <a:lstStyle/>
+          <a:p>
+            <a:endParaRPr lang="pt-BR" sz="3200" b="0" strike="noStrike" spc="-1">
               <a:solidFill>
                 <a:srgbClr val="000000"/>
               </a:solidFill>
@@ -872,11 +1017,12 @@
           </a:prstGeom>
         </p:spPr>
         <p:txBody>
-          <a:bodyPr lIns="0" rIns="0" tIns="0" bIns="0">
+          <a:bodyPr lIns="0" tIns="0" rIns="0" bIns="0">
             <a:normAutofit/>
           </a:bodyPr>
-          <a:p>
-            <a:endParaRPr b="0" lang="pt-BR" sz="3200" spc="-1" strike="noStrike">
+          <a:lstStyle/>
+          <a:p>
+            <a:endParaRPr lang="pt-BR" sz="3200" b="0" strike="noStrike" spc="-1">
               <a:solidFill>
                 <a:srgbClr val="000000"/>
               </a:solidFill>
@@ -887,11 +1033,14 @@
       </p:sp>
     </p:spTree>
   </p:cSld>
+  <p:clrMapOvr>
+    <a:masterClrMapping/>
+  </p:clrMapOvr>
 </p:sldLayout>
 </file>
 
 <file path=ppt/slideLayouts/slideLayout5.xml><?xml version="1.0" encoding="utf-8"?>
-<p:sldLayout xmlns:a="http://schemas.openxmlformats.org/drawingml/2006/main" xmlns:p="http://schemas.openxmlformats.org/presentationml/2006/main" xmlns:r="http://schemas.openxmlformats.org/officeDocument/2006/relationships" xmlns:p14="http://schemas.microsoft.com/office/powerpoint/2010/main" xmlns:p15="http://schemas.microsoft.com/office/powerpoint/2012/main" xmlns:mc="http://schemas.openxmlformats.org/markup-compatibility/2006" type="titleOnly" preserve="1">
+<p:sldLayout xmlns:a="http://schemas.openxmlformats.org/drawingml/2006/main" xmlns:r="http://schemas.openxmlformats.org/officeDocument/2006/relationships" xmlns:p="http://schemas.openxmlformats.org/presentationml/2006/main" type="titleOnly" preserve="1">
   <p:cSld name="Title Only">
     <p:spTree>
       <p:nvGrpSpPr>
@@ -927,9 +1076,10 @@
           </a:prstGeom>
         </p:spPr>
         <p:txBody>
-          <a:bodyPr lIns="0" rIns="0" tIns="0" bIns="0" anchor="ctr"/>
-          <a:p>
-            <a:endParaRPr b="0" lang="pt-BR" sz="1800" spc="-1" strike="noStrike">
+          <a:bodyPr lIns="0" tIns="0" rIns="0" bIns="0" anchor="ctr"/>
+          <a:lstStyle/>
+          <a:p>
+            <a:endParaRPr lang="pt-BR" sz="1800" b="0" strike="noStrike" spc="-1">
               <a:solidFill>
                 <a:srgbClr val="000000"/>
               </a:solidFill>
@@ -940,11 +1090,14 @@
       </p:sp>
     </p:spTree>
   </p:cSld>
+  <p:clrMapOvr>
+    <a:masterClrMapping/>
+  </p:clrMapOvr>
 </p:sldLayout>
 </file>
 
 <file path=ppt/slideLayouts/slideLayout6.xml><?xml version="1.0" encoding="utf-8"?>
-<p:sldLayout xmlns:a="http://schemas.openxmlformats.org/drawingml/2006/main" xmlns:p="http://schemas.openxmlformats.org/presentationml/2006/main" xmlns:r="http://schemas.openxmlformats.org/officeDocument/2006/relationships" xmlns:p14="http://schemas.microsoft.com/office/powerpoint/2010/main" xmlns:p15="http://schemas.microsoft.com/office/powerpoint/2012/main" xmlns:mc="http://schemas.openxmlformats.org/markup-compatibility/2006" type="objOnly" preserve="1">
+<p:sldLayout xmlns:a="http://schemas.openxmlformats.org/drawingml/2006/main" xmlns:r="http://schemas.openxmlformats.org/officeDocument/2006/relationships" xmlns:p="http://schemas.openxmlformats.org/presentationml/2006/main" type="objOnly" preserve="1">
   <p:cSld name="Centered Text">
     <p:spTree>
       <p:nvGrpSpPr>
@@ -980,10 +1133,11 @@
           </a:prstGeom>
         </p:spPr>
         <p:txBody>
-          <a:bodyPr lIns="0" rIns="0" tIns="0" bIns="0" anchor="ctr"/>
+          <a:bodyPr lIns="0" tIns="0" rIns="0" bIns="0" anchor="ctr"/>
+          <a:lstStyle/>
           <a:p>
             <a:pPr algn="ctr"/>
-            <a:endParaRPr b="0" lang="pt-BR" sz="3200" spc="-1" strike="noStrike">
+            <a:endParaRPr lang="pt-BR" sz="3200" b="0" strike="noStrike" spc="-1">
               <a:latin typeface="Arial"/>
             </a:endParaRPr>
           </a:p>
@@ -991,11 +1145,14 @@
       </p:sp>
     </p:spTree>
   </p:cSld>
+  <p:clrMapOvr>
+    <a:masterClrMapping/>
+  </p:clrMapOvr>
 </p:sldLayout>
 </file>
 
 <file path=ppt/slideLayouts/slideLayout7.xml><?xml version="1.0" encoding="utf-8"?>
-<p:sldLayout xmlns:a="http://schemas.openxmlformats.org/drawingml/2006/main" xmlns:p="http://schemas.openxmlformats.org/presentationml/2006/main" xmlns:r="http://schemas.openxmlformats.org/officeDocument/2006/relationships" xmlns:p14="http://schemas.microsoft.com/office/powerpoint/2010/main" xmlns:p15="http://schemas.microsoft.com/office/powerpoint/2012/main" xmlns:mc="http://schemas.openxmlformats.org/markup-compatibility/2006" type="twoObjAndObj" preserve="1">
+<p:sldLayout xmlns:a="http://schemas.openxmlformats.org/drawingml/2006/main" xmlns:r="http://schemas.openxmlformats.org/officeDocument/2006/relationships" xmlns:p="http://schemas.openxmlformats.org/presentationml/2006/main" type="twoObjAndObj" preserve="1">
   <p:cSld name="Title, 2 Content and Content">
     <p:spTree>
       <p:nvGrpSpPr>
@@ -1031,9 +1188,10 @@
           </a:prstGeom>
         </p:spPr>
         <p:txBody>
-          <a:bodyPr lIns="0" rIns="0" tIns="0" bIns="0" anchor="ctr"/>
-          <a:p>
-            <a:endParaRPr b="0" lang="pt-BR" sz="1800" spc="-1" strike="noStrike">
+          <a:bodyPr lIns="0" tIns="0" rIns="0" bIns="0" anchor="ctr"/>
+          <a:lstStyle/>
+          <a:p>
+            <a:endParaRPr lang="pt-BR" sz="1800" b="0" strike="noStrike" spc="-1">
               <a:solidFill>
                 <a:srgbClr val="000000"/>
               </a:solidFill>
@@ -1062,11 +1220,12 @@
           </a:prstGeom>
         </p:spPr>
         <p:txBody>
-          <a:bodyPr lIns="0" rIns="0" tIns="0" bIns="0">
+          <a:bodyPr lIns="0" tIns="0" rIns="0" bIns="0">
             <a:normAutofit/>
           </a:bodyPr>
-          <a:p>
-            <a:endParaRPr b="0" lang="pt-BR" sz="3200" spc="-1" strike="noStrike">
+          <a:lstStyle/>
+          <a:p>
+            <a:endParaRPr lang="pt-BR" sz="3200" b="0" strike="noStrike" spc="-1">
               <a:solidFill>
                 <a:srgbClr val="000000"/>
               </a:solidFill>
@@ -1095,11 +1254,12 @@
           </a:prstGeom>
         </p:spPr>
         <p:txBody>
-          <a:bodyPr lIns="0" rIns="0" tIns="0" bIns="0">
+          <a:bodyPr lIns="0" tIns="0" rIns="0" bIns="0">
             <a:normAutofit/>
           </a:bodyPr>
-          <a:p>
-            <a:endParaRPr b="0" lang="pt-BR" sz="3200" spc="-1" strike="noStrike">
+          <a:lstStyle/>
+          <a:p>
+            <a:endParaRPr lang="pt-BR" sz="3200" b="0" strike="noStrike" spc="-1">
               <a:solidFill>
                 <a:srgbClr val="000000"/>
               </a:solidFill>
@@ -1128,11 +1288,12 @@
           </a:prstGeom>
         </p:spPr>
         <p:txBody>
-          <a:bodyPr lIns="0" rIns="0" tIns="0" bIns="0">
+          <a:bodyPr lIns="0" tIns="0" rIns="0" bIns="0">
             <a:normAutofit/>
           </a:bodyPr>
-          <a:p>
-            <a:endParaRPr b="0" lang="pt-BR" sz="3200" spc="-1" strike="noStrike">
+          <a:lstStyle/>
+          <a:p>
+            <a:endParaRPr lang="pt-BR" sz="3200" b="0" strike="noStrike" spc="-1">
               <a:solidFill>
                 <a:srgbClr val="000000"/>
               </a:solidFill>
@@ -1143,11 +1304,14 @@
       </p:sp>
     </p:spTree>
   </p:cSld>
+  <p:clrMapOvr>
+    <a:masterClrMapping/>
+  </p:clrMapOvr>
 </p:sldLayout>
 </file>
 
 <file path=ppt/slideLayouts/slideLayout8.xml><?xml version="1.0" encoding="utf-8"?>
-<p:sldLayout xmlns:a="http://schemas.openxmlformats.org/drawingml/2006/main" xmlns:p="http://schemas.openxmlformats.org/presentationml/2006/main" xmlns:r="http://schemas.openxmlformats.org/officeDocument/2006/relationships" xmlns:p14="http://schemas.microsoft.com/office/powerpoint/2010/main" xmlns:p15="http://schemas.microsoft.com/office/powerpoint/2012/main" xmlns:mc="http://schemas.openxmlformats.org/markup-compatibility/2006" type="objAndTwoObj" preserve="1">
+<p:sldLayout xmlns:a="http://schemas.openxmlformats.org/drawingml/2006/main" xmlns:r="http://schemas.openxmlformats.org/officeDocument/2006/relationships" xmlns:p="http://schemas.openxmlformats.org/presentationml/2006/main" type="objAndTwoObj" preserve="1">
   <p:cSld name="Title Content and 2 Content">
     <p:spTree>
       <p:nvGrpSpPr>
@@ -1183,9 +1347,10 @@
           </a:prstGeom>
         </p:spPr>
         <p:txBody>
-          <a:bodyPr lIns="0" rIns="0" tIns="0" bIns="0" anchor="ctr"/>
-          <a:p>
-            <a:endParaRPr b="0" lang="pt-BR" sz="1800" spc="-1" strike="noStrike">
+          <a:bodyPr lIns="0" tIns="0" rIns="0" bIns="0" anchor="ctr"/>
+          <a:lstStyle/>
+          <a:p>
+            <a:endParaRPr lang="pt-BR" sz="1800" b="0" strike="noStrike" spc="-1">
               <a:solidFill>
                 <a:srgbClr val="000000"/>
               </a:solidFill>
@@ -1214,11 +1379,12 @@
           </a:prstGeom>
         </p:spPr>
         <p:txBody>
-          <a:bodyPr lIns="0" rIns="0" tIns="0" bIns="0">
+          <a:bodyPr lIns="0" tIns="0" rIns="0" bIns="0">
             <a:normAutofit/>
           </a:bodyPr>
-          <a:p>
-            <a:endParaRPr b="0" lang="pt-BR" sz="3200" spc="-1" strike="noStrike">
+          <a:lstStyle/>
+          <a:p>
+            <a:endParaRPr lang="pt-BR" sz="3200" b="0" strike="noStrike" spc="-1">
               <a:solidFill>
                 <a:srgbClr val="000000"/>
               </a:solidFill>
@@ -1247,11 +1413,12 @@
           </a:prstGeom>
         </p:spPr>
         <p:txBody>
-          <a:bodyPr lIns="0" rIns="0" tIns="0" bIns="0">
+          <a:bodyPr lIns="0" tIns="0" rIns="0" bIns="0">
             <a:normAutofit/>
           </a:bodyPr>
-          <a:p>
-            <a:endParaRPr b="0" lang="pt-BR" sz="3200" spc="-1" strike="noStrike">
+          <a:lstStyle/>
+          <a:p>
+            <a:endParaRPr lang="pt-BR" sz="3200" b="0" strike="noStrike" spc="-1">
               <a:solidFill>
                 <a:srgbClr val="000000"/>
               </a:solidFill>
@@ -1280,11 +1447,12 @@
           </a:prstGeom>
         </p:spPr>
         <p:txBody>
-          <a:bodyPr lIns="0" rIns="0" tIns="0" bIns="0">
+          <a:bodyPr lIns="0" tIns="0" rIns="0" bIns="0">
             <a:normAutofit/>
           </a:bodyPr>
-          <a:p>
-            <a:endParaRPr b="0" lang="pt-BR" sz="3200" spc="-1" strike="noStrike">
+          <a:lstStyle/>
+          <a:p>
+            <a:endParaRPr lang="pt-BR" sz="3200" b="0" strike="noStrike" spc="-1">
               <a:solidFill>
                 <a:srgbClr val="000000"/>
               </a:solidFill>
@@ -1295,11 +1463,14 @@
       </p:sp>
     </p:spTree>
   </p:cSld>
+  <p:clrMapOvr>
+    <a:masterClrMapping/>
+  </p:clrMapOvr>
 </p:sldLayout>
 </file>
 
 <file path=ppt/slideLayouts/slideLayout9.xml><?xml version="1.0" encoding="utf-8"?>
-<p:sldLayout xmlns:a="http://schemas.openxmlformats.org/drawingml/2006/main" xmlns:p="http://schemas.openxmlformats.org/presentationml/2006/main" xmlns:r="http://schemas.openxmlformats.org/officeDocument/2006/relationships" xmlns:p14="http://schemas.microsoft.com/office/powerpoint/2010/main" xmlns:p15="http://schemas.microsoft.com/office/powerpoint/2012/main" xmlns:mc="http://schemas.openxmlformats.org/markup-compatibility/2006" type="twoObjOverTx" preserve="1">
+<p:sldLayout xmlns:a="http://schemas.openxmlformats.org/drawingml/2006/main" xmlns:r="http://schemas.openxmlformats.org/officeDocument/2006/relationships" xmlns:p="http://schemas.openxmlformats.org/presentationml/2006/main" type="twoObjOverTx" preserve="1">
   <p:cSld name="Title, 2 Content over Content">
     <p:spTree>
       <p:nvGrpSpPr>
@@ -1335,9 +1506,10 @@
           </a:prstGeom>
         </p:spPr>
         <p:txBody>
-          <a:bodyPr lIns="0" rIns="0" tIns="0" bIns="0" anchor="ctr"/>
-          <a:p>
-            <a:endParaRPr b="0" lang="pt-BR" sz="1800" spc="-1" strike="noStrike">
+          <a:bodyPr lIns="0" tIns="0" rIns="0" bIns="0" anchor="ctr"/>
+          <a:lstStyle/>
+          <a:p>
+            <a:endParaRPr lang="pt-BR" sz="1800" b="0" strike="noStrike" spc="-1">
               <a:solidFill>
                 <a:srgbClr val="000000"/>
               </a:solidFill>
@@ -1366,11 +1538,12 @@
           </a:prstGeom>
         </p:spPr>
         <p:txBody>
-          <a:bodyPr lIns="0" rIns="0" tIns="0" bIns="0">
+          <a:bodyPr lIns="0" tIns="0" rIns="0" bIns="0">
             <a:normAutofit/>
           </a:bodyPr>
-          <a:p>
-            <a:endParaRPr b="0" lang="pt-BR" sz="3200" spc="-1" strike="noStrike">
+          <a:lstStyle/>
+          <a:p>
+            <a:endParaRPr lang="pt-BR" sz="3200" b="0" strike="noStrike" spc="-1">
               <a:solidFill>
                 <a:srgbClr val="000000"/>
               </a:solidFill>
@@ -1399,11 +1572,12 @@
           </a:prstGeom>
         </p:spPr>
         <p:txBody>
-          <a:bodyPr lIns="0" rIns="0" tIns="0" bIns="0">
+          <a:bodyPr lIns="0" tIns="0" rIns="0" bIns="0">
             <a:normAutofit/>
           </a:bodyPr>
-          <a:p>
-            <a:endParaRPr b="0" lang="pt-BR" sz="3200" spc="-1" strike="noStrike">
+          <a:lstStyle/>
+          <a:p>
+            <a:endParaRPr lang="pt-BR" sz="3200" b="0" strike="noStrike" spc="-1">
               <a:solidFill>
                 <a:srgbClr val="000000"/>
               </a:solidFill>
@@ -1432,11 +1606,12 @@
           </a:prstGeom>
         </p:spPr>
         <p:txBody>
-          <a:bodyPr lIns="0" rIns="0" tIns="0" bIns="0">
+          <a:bodyPr lIns="0" tIns="0" rIns="0" bIns="0">
             <a:normAutofit/>
           </a:bodyPr>
-          <a:p>
-            <a:endParaRPr b="0" lang="pt-BR" sz="3200" spc="-1" strike="noStrike">
+          <a:lstStyle/>
+          <a:p>
+            <a:endParaRPr lang="pt-BR" sz="3200" b="0" strike="noStrike" spc="-1">
               <a:solidFill>
                 <a:srgbClr val="000000"/>
               </a:solidFill>
@@ -1447,17 +1622,21 @@
       </p:sp>
     </p:spTree>
   </p:cSld>
+  <p:clrMapOvr>
+    <a:masterClrMapping/>
+  </p:clrMapOvr>
 </p:sldLayout>
 </file>
 
 <file path=ppt/slideMasters/slideMaster1.xml><?xml version="1.0" encoding="utf-8"?>
-<p:sldMaster xmlns:a="http://schemas.openxmlformats.org/drawingml/2006/main" xmlns:p="http://schemas.openxmlformats.org/presentationml/2006/main" xmlns:r="http://schemas.openxmlformats.org/officeDocument/2006/relationships" xmlns:p14="http://schemas.microsoft.com/office/powerpoint/2010/main" xmlns:p15="http://schemas.microsoft.com/office/powerpoint/2012/main" xmlns:mc="http://schemas.openxmlformats.org/markup-compatibility/2006">
+<p:sldMaster xmlns:a="http://schemas.openxmlformats.org/drawingml/2006/main" xmlns:r="http://schemas.openxmlformats.org/officeDocument/2006/relationships" xmlns:p="http://schemas.openxmlformats.org/presentationml/2006/main">
   <p:cSld>
     <p:bg>
       <p:bgPr>
         <a:solidFill>
-          <a:srgbClr val="f2f2f2"/>
+          <a:srgbClr val="F2F2F2"/>
         </a:solidFill>
+        <a:effectLst/>
       </p:bgPr>
     </p:bg>
     <p:spTree>
@@ -1476,7 +1655,7 @@
       </p:grpSpPr>
       <p:sp>
         <p:nvSpPr>
-          <p:cNvPr id="0" name="PlaceHolder 1"/>
+          <p:cNvPr id="5" name="PlaceHolder 1"/>
           <p:cNvSpPr>
             <a:spLocks noGrp="1"/>
           </p:cNvSpPr>
@@ -1495,6 +1674,7 @@
         </p:spPr>
         <p:txBody>
           <a:bodyPr anchor="ctr"/>
+          <a:lstStyle/>
           <a:p>
             <a:pPr algn="ctr">
               <a:lnSpc>
@@ -1502,80 +1682,20 @@
               </a:lnSpc>
             </a:pPr>
             <a:r>
-              <a:rPr b="0" lang="pt-BR" sz="4400" spc="-1" strike="noStrike">
+              <a:rPr lang="pt-BR" sz="4400" b="0" strike="noStrike" spc="-1">
                 <a:solidFill>
                   <a:srgbClr val="000000"/>
                 </a:solidFill>
                 <a:latin typeface="Calibri"/>
               </a:rPr>
-              <a:t>Clique </a:t>
+              <a:t>Clique para editar o título mestre</a:t>
             </a:r>
-            <a:r>
-              <a:rPr b="0" lang="pt-BR" sz="4400" spc="-1" strike="noStrike">
-                <a:solidFill>
-                  <a:srgbClr val="000000"/>
-                </a:solidFill>
-                <a:latin typeface="Calibri"/>
-              </a:rPr>
-              <a:t>para </a:t>
-            </a:r>
-            <a:r>
-              <a:rPr b="0" lang="pt-BR" sz="4400" spc="-1" strike="noStrike">
-                <a:solidFill>
-                  <a:srgbClr val="000000"/>
-                </a:solidFill>
-                <a:latin typeface="Calibri"/>
-              </a:rPr>
-              <a:t>editar </a:t>
-            </a:r>
-            <a:r>
-              <a:rPr b="0" lang="pt-BR" sz="4400" spc="-1" strike="noStrike">
-                <a:solidFill>
-                  <a:srgbClr val="000000"/>
-                </a:solidFill>
-                <a:latin typeface="Calibri"/>
-              </a:rPr>
-              <a:t>o </a:t>
-            </a:r>
-            <a:r>
-              <a:rPr b="0" lang="pt-BR" sz="4400" spc="-1" strike="noStrike">
-                <a:solidFill>
-                  <a:srgbClr val="000000"/>
-                </a:solidFill>
-                <a:latin typeface="Calibri"/>
-              </a:rPr>
-              <a:t>título </a:t>
-            </a:r>
-            <a:r>
-              <a:rPr b="0" lang="pt-BR" sz="4400" spc="-1" strike="noStrike">
-                <a:solidFill>
-                  <a:srgbClr val="000000"/>
-                </a:solidFill>
-                <a:latin typeface="Calibri"/>
-              </a:rPr>
-              <a:t>mestr</a:t>
-            </a:r>
-            <a:r>
-              <a:rPr b="0" lang="pt-BR" sz="4400" spc="-1" strike="noStrike">
-                <a:solidFill>
-                  <a:srgbClr val="000000"/>
-                </a:solidFill>
-                <a:latin typeface="Calibri"/>
-              </a:rPr>
-              <a:t>e</a:t>
-            </a:r>
-            <a:endParaRPr b="0" lang="pt-BR" sz="4400" spc="-1" strike="noStrike">
-              <a:solidFill>
-                <a:srgbClr val="000000"/>
-              </a:solidFill>
-              <a:latin typeface="Calibri"/>
-            </a:endParaRPr>
-          </a:p>
-        </p:txBody>
-      </p:sp>
-      <p:sp>
-        <p:nvSpPr>
-          <p:cNvPr id="1" name="PlaceHolder 2"/>
+          </a:p>
+        </p:txBody>
+      </p:sp>
+      <p:sp>
+        <p:nvSpPr>
+          <p:cNvPr id="6" name="PlaceHolder 2"/>
           <p:cNvSpPr>
             <a:spLocks noGrp="1"/>
           </p:cNvSpPr>
@@ -1594,6 +1714,7 @@
         </p:spPr>
         <p:txBody>
           <a:bodyPr anchor="ctr"/>
+          <a:lstStyle/>
           <a:p>
             <a:pPr>
               <a:lnSpc>
@@ -1601,15 +1722,15 @@
               </a:lnSpc>
             </a:pPr>
             <a:fld id="{69CBF638-6EA5-41FA-93A9-590D48A4E235}" type="datetime">
-              <a:rPr b="0" lang="pt-BR" sz="1200" spc="-1" strike="noStrike">
+              <a:rPr lang="pt-BR" sz="1200" b="0" strike="noStrike" spc="-1">
                 <a:solidFill>
-                  <a:srgbClr val="8b8b8b"/>
+                  <a:srgbClr val="8B8B8B"/>
                 </a:solidFill>
                 <a:latin typeface="Calibri"/>
               </a:rPr>
-              <a:t>24/06/19</a:t>
+              <a:t>24/06/2019</a:t>
             </a:fld>
-            <a:endParaRPr b="0" lang="pt-BR" sz="1200" spc="-1" strike="noStrike">
+            <a:endParaRPr lang="pt-BR" sz="1200" b="0" strike="noStrike" spc="-1">
               <a:latin typeface="Times New Roman"/>
             </a:endParaRPr>
           </a:p>
@@ -1636,8 +1757,9 @@
         </p:spPr>
         <p:txBody>
           <a:bodyPr anchor="ctr"/>
-          <a:p>
-            <a:endParaRPr b="0" lang="pt-BR" sz="2400" spc="-1" strike="noStrike">
+          <a:lstStyle/>
+          <a:p>
+            <a:endParaRPr lang="pt-BR" sz="2400" b="0" strike="noStrike" spc="-1">
               <a:latin typeface="Times New Roman"/>
             </a:endParaRPr>
           </a:p>
@@ -1664,6 +1786,7 @@
         </p:spPr>
         <p:txBody>
           <a:bodyPr anchor="ctr"/>
+          <a:lstStyle/>
           <a:p>
             <a:pPr algn="r">
               <a:lnSpc>
@@ -1671,15 +1794,15 @@
               </a:lnSpc>
             </a:pPr>
             <a:fld id="{6AB95433-CC59-454E-8536-EFB6C426129D}" type="slidenum">
-              <a:rPr b="0" lang="pt-BR" sz="1200" spc="-1" strike="noStrike">
+              <a:rPr lang="pt-BR" sz="1200" b="0" strike="noStrike" spc="-1">
                 <a:solidFill>
-                  <a:srgbClr val="8b8b8b"/>
+                  <a:srgbClr val="8B8B8B"/>
                 </a:solidFill>
                 <a:latin typeface="Calibri"/>
               </a:rPr>
-              <a:t>&lt;número&gt;</a:t>
+              <a:t>‹nº›</a:t>
             </a:fld>
-            <a:endParaRPr b="0" lang="pt-BR" sz="1200" spc="-1" strike="noStrike">
+            <a:endParaRPr lang="pt-BR" sz="1200" b="0" strike="noStrike" spc="-1">
               <a:latin typeface="Times New Roman"/>
             </a:endParaRPr>
           </a:p>
@@ -1705,9 +1828,10 @@
           </a:prstGeom>
         </p:spPr>
         <p:txBody>
-          <a:bodyPr lIns="0" rIns="0" tIns="0" bIns="0">
+          <a:bodyPr lIns="0" tIns="0" rIns="0" bIns="0">
             <a:normAutofit/>
           </a:bodyPr>
+          <a:lstStyle/>
           <a:p>
             <a:pPr marL="432000" indent="-324000">
               <a:spcBef>
@@ -1721,7 +1845,7 @@
               <a:buChar char=""/>
             </a:pPr>
             <a:r>
-              <a:rPr b="0" lang="pt-BR" sz="3200" spc="-1" strike="noStrike">
+              <a:rPr lang="pt-BR" sz="3200" b="0" strike="noStrike" spc="-1">
                 <a:solidFill>
                   <a:srgbClr val="000000"/>
                 </a:solidFill>
@@ -1729,15 +1853,9 @@
               </a:rPr>
               <a:t>Clique para editar o formato do texto da estrutura de tópicos</a:t>
             </a:r>
-            <a:endParaRPr b="0" lang="pt-BR" sz="3200" spc="-1" strike="noStrike">
-              <a:solidFill>
-                <a:srgbClr val="000000"/>
-              </a:solidFill>
-              <a:latin typeface="Calibri"/>
-            </a:endParaRPr>
-          </a:p>
-          <a:p>
-            <a:pPr lvl="1" marL="864000" indent="-324000">
+          </a:p>
+          <a:p>
+            <a:pPr marL="864000" lvl="1" indent="-324000">
               <a:spcBef>
                 <a:spcPts val="1134"/>
               </a:spcBef>
@@ -1749,7 +1867,7 @@
               <a:buChar char=""/>
             </a:pPr>
             <a:r>
-              <a:rPr b="0" lang="pt-BR" sz="2400" spc="-1" strike="noStrike">
+              <a:rPr lang="pt-BR" sz="2400" b="0" strike="noStrike" spc="-1">
                 <a:solidFill>
                   <a:srgbClr val="000000"/>
                 </a:solidFill>
@@ -1757,15 +1875,9 @@
               </a:rPr>
               <a:t>2.º nível da estrutura de tópicos</a:t>
             </a:r>
-            <a:endParaRPr b="0" lang="pt-BR" sz="2400" spc="-1" strike="noStrike">
-              <a:solidFill>
-                <a:srgbClr val="000000"/>
-              </a:solidFill>
-              <a:latin typeface="Calibri"/>
-            </a:endParaRPr>
-          </a:p>
-          <a:p>
-            <a:pPr lvl="2" marL="1296000" indent="-288000">
+          </a:p>
+          <a:p>
+            <a:pPr marL="1296000" lvl="2" indent="-288000">
               <a:spcBef>
                 <a:spcPts val="850"/>
               </a:spcBef>
@@ -1777,7 +1889,7 @@
               <a:buChar char=""/>
             </a:pPr>
             <a:r>
-              <a:rPr b="0" lang="pt-BR" sz="2000" spc="-1" strike="noStrike">
+              <a:rPr lang="pt-BR" sz="2000" b="0" strike="noStrike" spc="-1">
                 <a:solidFill>
                   <a:srgbClr val="000000"/>
                 </a:solidFill>
@@ -1785,15 +1897,9 @@
               </a:rPr>
               <a:t>3.º nível da estrutura de tópicos</a:t>
             </a:r>
-            <a:endParaRPr b="0" lang="pt-BR" sz="2000" spc="-1" strike="noStrike">
-              <a:solidFill>
-                <a:srgbClr val="000000"/>
-              </a:solidFill>
-              <a:latin typeface="Calibri"/>
-            </a:endParaRPr>
-          </a:p>
-          <a:p>
-            <a:pPr lvl="3" marL="1728000" indent="-216000">
+          </a:p>
+          <a:p>
+            <a:pPr marL="1728000" lvl="3" indent="-216000">
               <a:spcBef>
                 <a:spcPts val="567"/>
               </a:spcBef>
@@ -1805,7 +1911,7 @@
               <a:buChar char=""/>
             </a:pPr>
             <a:r>
-              <a:rPr b="0" lang="pt-BR" sz="2000" spc="-1" strike="noStrike">
+              <a:rPr lang="pt-BR" sz="2000" b="0" strike="noStrike" spc="-1">
                 <a:solidFill>
                   <a:srgbClr val="000000"/>
                 </a:solidFill>
@@ -1813,15 +1919,9 @@
               </a:rPr>
               <a:t>4.º nível da estrutura de tópicos</a:t>
             </a:r>
-            <a:endParaRPr b="0" lang="pt-BR" sz="2000" spc="-1" strike="noStrike">
-              <a:solidFill>
-                <a:srgbClr val="000000"/>
-              </a:solidFill>
-              <a:latin typeface="Calibri"/>
-            </a:endParaRPr>
-          </a:p>
-          <a:p>
-            <a:pPr lvl="4" marL="2160000" indent="-216000">
+          </a:p>
+          <a:p>
+            <a:pPr marL="2160000" lvl="4" indent="-216000">
               <a:spcBef>
                 <a:spcPts val="283"/>
               </a:spcBef>
@@ -1833,7 +1933,7 @@
               <a:buChar char=""/>
             </a:pPr>
             <a:r>
-              <a:rPr b="0" lang="pt-BR" sz="2000" spc="-1" strike="noStrike">
+              <a:rPr lang="pt-BR" sz="2000" b="0" strike="noStrike" spc="-1">
                 <a:solidFill>
                   <a:srgbClr val="000000"/>
                 </a:solidFill>
@@ -1841,15 +1941,9 @@
               </a:rPr>
               <a:t>5.º nível da estrutura de tópicos</a:t>
             </a:r>
-            <a:endParaRPr b="0" lang="pt-BR" sz="2000" spc="-1" strike="noStrike">
-              <a:solidFill>
-                <a:srgbClr val="000000"/>
-              </a:solidFill>
-              <a:latin typeface="Calibri"/>
-            </a:endParaRPr>
-          </a:p>
-          <a:p>
-            <a:pPr lvl="5" marL="2592000" indent="-216000">
+          </a:p>
+          <a:p>
+            <a:pPr marL="2592000" lvl="5" indent="-216000">
               <a:spcBef>
                 <a:spcPts val="283"/>
               </a:spcBef>
@@ -1861,7 +1955,7 @@
               <a:buChar char=""/>
             </a:pPr>
             <a:r>
-              <a:rPr b="0" lang="pt-BR" sz="2000" spc="-1" strike="noStrike">
+              <a:rPr lang="pt-BR" sz="2000" b="0" strike="noStrike" spc="-1">
                 <a:solidFill>
                   <a:srgbClr val="000000"/>
                 </a:solidFill>
@@ -1869,15 +1963,9 @@
               </a:rPr>
               <a:t>6.º nível da estrutura de tópicos</a:t>
             </a:r>
-            <a:endParaRPr b="0" lang="pt-BR" sz="2000" spc="-1" strike="noStrike">
-              <a:solidFill>
-                <a:srgbClr val="000000"/>
-              </a:solidFill>
-              <a:latin typeface="Calibri"/>
-            </a:endParaRPr>
-          </a:p>
-          <a:p>
-            <a:pPr lvl="6" marL="3024000" indent="-216000">
+          </a:p>
+          <a:p>
+            <a:pPr marL="3024000" lvl="6" indent="-216000">
               <a:spcBef>
                 <a:spcPts val="283"/>
               </a:spcBef>
@@ -1889,7 +1977,7 @@
               <a:buChar char=""/>
             </a:pPr>
             <a:r>
-              <a:rPr b="0" lang="pt-BR" sz="2000" spc="-1" strike="noStrike">
+              <a:rPr lang="pt-BR" sz="2000" b="0" strike="noStrike" spc="-1">
                 <a:solidFill>
                   <a:srgbClr val="000000"/>
                 </a:solidFill>
@@ -1897,43 +1985,318 @@
               </a:rPr>
               <a:t>7.º nível da estrutura de tópicos</a:t>
             </a:r>
-            <a:endParaRPr b="0" lang="pt-BR" sz="2000" spc="-1" strike="noStrike">
-              <a:solidFill>
-                <a:srgbClr val="000000"/>
-              </a:solidFill>
-              <a:latin typeface="Calibri"/>
-            </a:endParaRPr>
           </a:p>
         </p:txBody>
       </p:sp>
     </p:spTree>
   </p:cSld>
-  <p:clrMap bg1="lt1" bg2="lt2" tx1="dk1" tx2="dk2" accent1="accent1" accent2="accent2" accent3="accent3" accent4="accent4" accent5="accent5" accent6="accent6" hlink="hlink" folHlink="folHlink"/>
+  <p:clrMap bg1="lt1" tx1="dk1" bg2="lt2" tx2="dk2" accent1="accent1" accent2="accent2" accent3="accent3" accent4="accent4" accent5="accent5" accent6="accent6" hlink="hlink" folHlink="folHlink"/>
   <p:sldLayoutIdLst>
-    <p:sldLayoutId id="2147483649" r:id="rId2"/>
-    <p:sldLayoutId id="2147483650" r:id="rId3"/>
-    <p:sldLayoutId id="2147483651" r:id="rId4"/>
-    <p:sldLayoutId id="2147483652" r:id="rId5"/>
-    <p:sldLayoutId id="2147483653" r:id="rId6"/>
-    <p:sldLayoutId id="2147483654" r:id="rId7"/>
-    <p:sldLayoutId id="2147483655" r:id="rId8"/>
-    <p:sldLayoutId id="2147483656" r:id="rId9"/>
-    <p:sldLayoutId id="2147483657" r:id="rId10"/>
-    <p:sldLayoutId id="2147483658" r:id="rId11"/>
-    <p:sldLayoutId id="2147483659" r:id="rId12"/>
-    <p:sldLayoutId id="2147483660" r:id="rId13"/>
+    <p:sldLayoutId id="2147483649" r:id="rId1"/>
+    <p:sldLayoutId id="2147483650" r:id="rId2"/>
+    <p:sldLayoutId id="2147483651" r:id="rId3"/>
+    <p:sldLayoutId id="2147483652" r:id="rId4"/>
+    <p:sldLayoutId id="2147483653" r:id="rId5"/>
+    <p:sldLayoutId id="2147483654" r:id="rId6"/>
+    <p:sldLayoutId id="2147483655" r:id="rId7"/>
+    <p:sldLayoutId id="2147483656" r:id="rId8"/>
+    <p:sldLayoutId id="2147483657" r:id="rId9"/>
+    <p:sldLayoutId id="2147483658" r:id="rId10"/>
+    <p:sldLayoutId id="2147483659" r:id="rId11"/>
+    <p:sldLayoutId id="2147483660" r:id="rId12"/>
   </p:sldLayoutIdLst>
+  <p:txStyles>
+    <p:titleStyle>
+      <a:lvl1pPr algn="l" defTabSz="914400" rtl="0" eaLnBrk="1" latinLnBrk="0" hangingPunct="1">
+        <a:lnSpc>
+          <a:spcPct val="90000"/>
+        </a:lnSpc>
+        <a:spcBef>
+          <a:spcPct val="0"/>
+        </a:spcBef>
+        <a:buNone/>
+        <a:defRPr sz="4400" kern="1200">
+          <a:solidFill>
+            <a:schemeClr val="tx1"/>
+          </a:solidFill>
+          <a:latin typeface="+mj-lt"/>
+          <a:ea typeface="+mj-ea"/>
+          <a:cs typeface="+mj-cs"/>
+        </a:defRPr>
+      </a:lvl1pPr>
+    </p:titleStyle>
+    <p:bodyStyle>
+      <a:lvl1pPr marL="228600" indent="-228600" algn="l" defTabSz="914400" rtl="0" eaLnBrk="1" latinLnBrk="0" hangingPunct="1">
+        <a:lnSpc>
+          <a:spcPct val="90000"/>
+        </a:lnSpc>
+        <a:spcBef>
+          <a:spcPts val="1000"/>
+        </a:spcBef>
+        <a:buFont typeface="Arial" panose="020B0604020202020204" pitchFamily="34" charset="0"/>
+        <a:buChar char="•"/>
+        <a:defRPr sz="2800" kern="1200">
+          <a:solidFill>
+            <a:schemeClr val="tx1"/>
+          </a:solidFill>
+          <a:latin typeface="+mn-lt"/>
+          <a:ea typeface="+mn-ea"/>
+          <a:cs typeface="+mn-cs"/>
+        </a:defRPr>
+      </a:lvl1pPr>
+      <a:lvl2pPr marL="685800" indent="-228600" algn="l" defTabSz="914400" rtl="0" eaLnBrk="1" latinLnBrk="0" hangingPunct="1">
+        <a:lnSpc>
+          <a:spcPct val="90000"/>
+        </a:lnSpc>
+        <a:spcBef>
+          <a:spcPts val="500"/>
+        </a:spcBef>
+        <a:buFont typeface="Arial" panose="020B0604020202020204" pitchFamily="34" charset="0"/>
+        <a:buChar char="•"/>
+        <a:defRPr sz="2400" kern="1200">
+          <a:solidFill>
+            <a:schemeClr val="tx1"/>
+          </a:solidFill>
+          <a:latin typeface="+mn-lt"/>
+          <a:ea typeface="+mn-ea"/>
+          <a:cs typeface="+mn-cs"/>
+        </a:defRPr>
+      </a:lvl2pPr>
+      <a:lvl3pPr marL="1143000" indent="-228600" algn="l" defTabSz="914400" rtl="0" eaLnBrk="1" latinLnBrk="0" hangingPunct="1">
+        <a:lnSpc>
+          <a:spcPct val="90000"/>
+        </a:lnSpc>
+        <a:spcBef>
+          <a:spcPts val="500"/>
+        </a:spcBef>
+        <a:buFont typeface="Arial" panose="020B0604020202020204" pitchFamily="34" charset="0"/>
+        <a:buChar char="•"/>
+        <a:defRPr sz="2000" kern="1200">
+          <a:solidFill>
+            <a:schemeClr val="tx1"/>
+          </a:solidFill>
+          <a:latin typeface="+mn-lt"/>
+          <a:ea typeface="+mn-ea"/>
+          <a:cs typeface="+mn-cs"/>
+        </a:defRPr>
+      </a:lvl3pPr>
+      <a:lvl4pPr marL="1600200" indent="-228600" algn="l" defTabSz="914400" rtl="0" eaLnBrk="1" latinLnBrk="0" hangingPunct="1">
+        <a:lnSpc>
+          <a:spcPct val="90000"/>
+        </a:lnSpc>
+        <a:spcBef>
+          <a:spcPts val="500"/>
+        </a:spcBef>
+        <a:buFont typeface="Arial" panose="020B0604020202020204" pitchFamily="34" charset="0"/>
+        <a:buChar char="•"/>
+        <a:defRPr sz="1800" kern="1200">
+          <a:solidFill>
+            <a:schemeClr val="tx1"/>
+          </a:solidFill>
+          <a:latin typeface="+mn-lt"/>
+          <a:ea typeface="+mn-ea"/>
+          <a:cs typeface="+mn-cs"/>
+        </a:defRPr>
+      </a:lvl4pPr>
+      <a:lvl5pPr marL="2057400" indent="-228600" algn="l" defTabSz="914400" rtl="0" eaLnBrk="1" latinLnBrk="0" hangingPunct="1">
+        <a:lnSpc>
+          <a:spcPct val="90000"/>
+        </a:lnSpc>
+        <a:spcBef>
+          <a:spcPts val="500"/>
+        </a:spcBef>
+        <a:buFont typeface="Arial" panose="020B0604020202020204" pitchFamily="34" charset="0"/>
+        <a:buChar char="•"/>
+        <a:defRPr sz="1800" kern="1200">
+          <a:solidFill>
+            <a:schemeClr val="tx1"/>
+          </a:solidFill>
+          <a:latin typeface="+mn-lt"/>
+          <a:ea typeface="+mn-ea"/>
+          <a:cs typeface="+mn-cs"/>
+        </a:defRPr>
+      </a:lvl5pPr>
+      <a:lvl6pPr marL="2514600" indent="-228600" algn="l" defTabSz="914400" rtl="0" eaLnBrk="1" latinLnBrk="0" hangingPunct="1">
+        <a:lnSpc>
+          <a:spcPct val="90000"/>
+        </a:lnSpc>
+        <a:spcBef>
+          <a:spcPts val="500"/>
+        </a:spcBef>
+        <a:buFont typeface="Arial" panose="020B0604020202020204" pitchFamily="34" charset="0"/>
+        <a:buChar char="•"/>
+        <a:defRPr sz="1800" kern="1200">
+          <a:solidFill>
+            <a:schemeClr val="tx1"/>
+          </a:solidFill>
+          <a:latin typeface="+mn-lt"/>
+          <a:ea typeface="+mn-ea"/>
+          <a:cs typeface="+mn-cs"/>
+        </a:defRPr>
+      </a:lvl6pPr>
+      <a:lvl7pPr marL="2971800" indent="-228600" algn="l" defTabSz="914400" rtl="0" eaLnBrk="1" latinLnBrk="0" hangingPunct="1">
+        <a:lnSpc>
+          <a:spcPct val="90000"/>
+        </a:lnSpc>
+        <a:spcBef>
+          <a:spcPts val="500"/>
+        </a:spcBef>
+        <a:buFont typeface="Arial" panose="020B0604020202020204" pitchFamily="34" charset="0"/>
+        <a:buChar char="•"/>
+        <a:defRPr sz="1800" kern="1200">
+          <a:solidFill>
+            <a:schemeClr val="tx1"/>
+          </a:solidFill>
+          <a:latin typeface="+mn-lt"/>
+          <a:ea typeface="+mn-ea"/>
+          <a:cs typeface="+mn-cs"/>
+        </a:defRPr>
+      </a:lvl7pPr>
+      <a:lvl8pPr marL="3429000" indent="-228600" algn="l" defTabSz="914400" rtl="0" eaLnBrk="1" latinLnBrk="0" hangingPunct="1">
+        <a:lnSpc>
+          <a:spcPct val="90000"/>
+        </a:lnSpc>
+        <a:spcBef>
+          <a:spcPts val="500"/>
+        </a:spcBef>
+        <a:buFont typeface="Arial" panose="020B0604020202020204" pitchFamily="34" charset="0"/>
+        <a:buChar char="•"/>
+        <a:defRPr sz="1800" kern="1200">
+          <a:solidFill>
+            <a:schemeClr val="tx1"/>
+          </a:solidFill>
+          <a:latin typeface="+mn-lt"/>
+          <a:ea typeface="+mn-ea"/>
+          <a:cs typeface="+mn-cs"/>
+        </a:defRPr>
+      </a:lvl8pPr>
+      <a:lvl9pPr marL="3886200" indent="-228600" algn="l" defTabSz="914400" rtl="0" eaLnBrk="1" latinLnBrk="0" hangingPunct="1">
+        <a:lnSpc>
+          <a:spcPct val="90000"/>
+        </a:lnSpc>
+        <a:spcBef>
+          <a:spcPts val="500"/>
+        </a:spcBef>
+        <a:buFont typeface="Arial" panose="020B0604020202020204" pitchFamily="34" charset="0"/>
+        <a:buChar char="•"/>
+        <a:defRPr sz="1800" kern="1200">
+          <a:solidFill>
+            <a:schemeClr val="tx1"/>
+          </a:solidFill>
+          <a:latin typeface="+mn-lt"/>
+          <a:ea typeface="+mn-ea"/>
+          <a:cs typeface="+mn-cs"/>
+        </a:defRPr>
+      </a:lvl9pPr>
+    </p:bodyStyle>
+    <p:otherStyle>
+      <a:defPPr>
+        <a:defRPr lang="pt-BR"/>
+      </a:defPPr>
+      <a:lvl1pPr marL="0" algn="l" defTabSz="914400" rtl="0" eaLnBrk="1" latinLnBrk="0" hangingPunct="1">
+        <a:defRPr sz="1800" kern="1200">
+          <a:solidFill>
+            <a:schemeClr val="tx1"/>
+          </a:solidFill>
+          <a:latin typeface="+mn-lt"/>
+          <a:ea typeface="+mn-ea"/>
+          <a:cs typeface="+mn-cs"/>
+        </a:defRPr>
+      </a:lvl1pPr>
+      <a:lvl2pPr marL="457200" algn="l" defTabSz="914400" rtl="0" eaLnBrk="1" latinLnBrk="0" hangingPunct="1">
+        <a:defRPr sz="1800" kern="1200">
+          <a:solidFill>
+            <a:schemeClr val="tx1"/>
+          </a:solidFill>
+          <a:latin typeface="+mn-lt"/>
+          <a:ea typeface="+mn-ea"/>
+          <a:cs typeface="+mn-cs"/>
+        </a:defRPr>
+      </a:lvl2pPr>
+      <a:lvl3pPr marL="914400" algn="l" defTabSz="914400" rtl="0" eaLnBrk="1" latinLnBrk="0" hangingPunct="1">
+        <a:defRPr sz="1800" kern="1200">
+          <a:solidFill>
+            <a:schemeClr val="tx1"/>
+          </a:solidFill>
+          <a:latin typeface="+mn-lt"/>
+          <a:ea typeface="+mn-ea"/>
+          <a:cs typeface="+mn-cs"/>
+        </a:defRPr>
+      </a:lvl3pPr>
+      <a:lvl4pPr marL="1371600" algn="l" defTabSz="914400" rtl="0" eaLnBrk="1" latinLnBrk="0" hangingPunct="1">
+        <a:defRPr sz="1800" kern="1200">
+          <a:solidFill>
+            <a:schemeClr val="tx1"/>
+          </a:solidFill>
+          <a:latin typeface="+mn-lt"/>
+          <a:ea typeface="+mn-ea"/>
+          <a:cs typeface="+mn-cs"/>
+        </a:defRPr>
+      </a:lvl4pPr>
+      <a:lvl5pPr marL="1828800" algn="l" defTabSz="914400" rtl="0" eaLnBrk="1" latinLnBrk="0" hangingPunct="1">
+        <a:defRPr sz="1800" kern="1200">
+          <a:solidFill>
+            <a:schemeClr val="tx1"/>
+          </a:solidFill>
+          <a:latin typeface="+mn-lt"/>
+          <a:ea typeface="+mn-ea"/>
+          <a:cs typeface="+mn-cs"/>
+        </a:defRPr>
+      </a:lvl5pPr>
+      <a:lvl6pPr marL="2286000" algn="l" defTabSz="914400" rtl="0" eaLnBrk="1" latinLnBrk="0" hangingPunct="1">
+        <a:defRPr sz="1800" kern="1200">
+          <a:solidFill>
+            <a:schemeClr val="tx1"/>
+          </a:solidFill>
+          <a:latin typeface="+mn-lt"/>
+          <a:ea typeface="+mn-ea"/>
+          <a:cs typeface="+mn-cs"/>
+        </a:defRPr>
+      </a:lvl6pPr>
+      <a:lvl7pPr marL="2743200" algn="l" defTabSz="914400" rtl="0" eaLnBrk="1" latinLnBrk="0" hangingPunct="1">
+        <a:defRPr sz="1800" kern="1200">
+          <a:solidFill>
+            <a:schemeClr val="tx1"/>
+          </a:solidFill>
+          <a:latin typeface="+mn-lt"/>
+          <a:ea typeface="+mn-ea"/>
+          <a:cs typeface="+mn-cs"/>
+        </a:defRPr>
+      </a:lvl7pPr>
+      <a:lvl8pPr marL="3200400" algn="l" defTabSz="914400" rtl="0" eaLnBrk="1" latinLnBrk="0" hangingPunct="1">
+        <a:defRPr sz="1800" kern="1200">
+          <a:solidFill>
+            <a:schemeClr val="tx1"/>
+          </a:solidFill>
+          <a:latin typeface="+mn-lt"/>
+          <a:ea typeface="+mn-ea"/>
+          <a:cs typeface="+mn-cs"/>
+        </a:defRPr>
+      </a:lvl8pPr>
+      <a:lvl9pPr marL="3657600" algn="l" defTabSz="914400" rtl="0" eaLnBrk="1" latinLnBrk="0" hangingPunct="1">
+        <a:defRPr sz="1800" kern="1200">
+          <a:solidFill>
+            <a:schemeClr val="tx1"/>
+          </a:solidFill>
+          <a:latin typeface="+mn-lt"/>
+          <a:ea typeface="+mn-ea"/>
+          <a:cs typeface="+mn-cs"/>
+        </a:defRPr>
+      </a:lvl9pPr>
+    </p:otherStyle>
+  </p:txStyles>
 </p:sldMaster>
 </file>
 
 <file path=ppt/slides/slide1.xml><?xml version="1.0" encoding="utf-8"?>
-<p:sld xmlns:a="http://schemas.openxmlformats.org/drawingml/2006/main" xmlns:p="http://schemas.openxmlformats.org/presentationml/2006/main" xmlns:r="http://schemas.openxmlformats.org/officeDocument/2006/relationships" xmlns:p14="http://schemas.microsoft.com/office/powerpoint/2010/main" xmlns:p15="http://schemas.microsoft.com/office/powerpoint/2012/main" xmlns:mc="http://schemas.openxmlformats.org/markup-compatibility/2006">
+<p:sld xmlns:a="http://schemas.openxmlformats.org/drawingml/2006/main" xmlns:r="http://schemas.openxmlformats.org/officeDocument/2006/relationships" xmlns:p="http://schemas.openxmlformats.org/presentationml/2006/main">
   <p:cSld>
     <p:bg>
       <p:bgPr>
         <a:solidFill>
-          <a:srgbClr val="f2f2f2"/>
+          <a:srgbClr val="F2F2F2"/>
         </a:solidFill>
+        <a:effectLst/>
       </p:bgPr>
     </p:bg>
     <p:spTree>
@@ -1952,12 +2315,12 @@
       </p:grpSpPr>
       <p:pic>
         <p:nvPicPr>
-          <p:cNvPr id="41" name="Imagem 20" descr=""/>
+          <p:cNvPr id="41" name="Imagem 20"/>
           <p:cNvPicPr/>
           <p:nvPr/>
         </p:nvPicPr>
         <p:blipFill>
-          <a:blip r:embed="rId1"/>
+          <a:blip r:embed="rId2"/>
           <a:stretch/>
         </p:blipFill>
         <p:spPr>
@@ -1993,13 +2356,20 @@
           </a:ln>
         </p:spPr>
         <p:style>
-          <a:lnRef idx="0"/>
-          <a:fillRef idx="0"/>
-          <a:effectRef idx="0"/>
+          <a:lnRef idx="0">
+            <a:scrgbClr r="0" g="0" b="0"/>
+          </a:lnRef>
+          <a:fillRef idx="0">
+            <a:scrgbClr r="0" g="0" b="0"/>
+          </a:fillRef>
+          <a:effectRef idx="0">
+            <a:scrgbClr r="0" g="0" b="0"/>
+          </a:effectRef>
           <a:fontRef idx="minor"/>
         </p:style>
         <p:txBody>
-          <a:bodyPr lIns="90000" rIns="90000" tIns="45000" bIns="45000"/>
+          <a:bodyPr lIns="90000" tIns="45000" rIns="90000" bIns="45000"/>
+          <a:lstStyle/>
           <a:p>
             <a:pPr algn="r">
               <a:lnSpc>
@@ -2007,7 +2377,7 @@
               </a:lnSpc>
             </a:pPr>
             <a:r>
-              <a:rPr b="0" lang="pt-BR" sz="1800" spc="-1" strike="noStrike">
+              <a:rPr lang="pt-BR" sz="1800" b="0" strike="noStrike" spc="-1">
                 <a:solidFill>
                   <a:srgbClr val="000000"/>
                 </a:solidFill>
@@ -2016,7 +2386,7 @@
               </a:rPr>
               <a:t>Ivens Diego Müller</a:t>
             </a:r>
-            <a:endParaRPr b="0" lang="pt-BR" sz="1800" spc="-1" strike="noStrike">
+            <a:endParaRPr lang="pt-BR" sz="1800" b="0" strike="noStrike" spc="-1">
               <a:latin typeface="Arial"/>
             </a:endParaRPr>
           </a:p>
@@ -2027,7 +2397,7 @@
               </a:lnSpc>
             </a:pPr>
             <a:r>
-              <a:rPr b="0" lang="pt-BR" sz="1800" spc="-1" strike="noStrike">
+              <a:rPr lang="pt-BR" sz="1800" b="0" strike="noStrike" spc="-1">
                 <a:solidFill>
                   <a:srgbClr val="000000"/>
                 </a:solidFill>
@@ -2036,7 +2406,7 @@
               </a:rPr>
               <a:t>Tiago Funk</a:t>
             </a:r>
-            <a:endParaRPr b="0" lang="pt-BR" sz="1800" spc="-1" strike="noStrike">
+            <a:endParaRPr lang="pt-BR" sz="1800" b="0" strike="noStrike" spc="-1">
               <a:latin typeface="Arial"/>
             </a:endParaRPr>
           </a:p>
@@ -2062,13 +2432,20 @@
           </a:ln>
         </p:spPr>
         <p:style>
-          <a:lnRef idx="0"/>
-          <a:fillRef idx="0"/>
-          <a:effectRef idx="0"/>
+          <a:lnRef idx="0">
+            <a:scrgbClr r="0" g="0" b="0"/>
+          </a:lnRef>
+          <a:fillRef idx="0">
+            <a:scrgbClr r="0" g="0" b="0"/>
+          </a:fillRef>
+          <a:effectRef idx="0">
+            <a:scrgbClr r="0" g="0" b="0"/>
+          </a:effectRef>
           <a:fontRef idx="minor"/>
         </p:style>
         <p:txBody>
-          <a:bodyPr lIns="90000" rIns="90000" tIns="45000" bIns="45000"/>
+          <a:bodyPr lIns="90000" tIns="45000" rIns="90000" bIns="45000"/>
+          <a:lstStyle/>
           <a:p>
             <a:pPr algn="r">
               <a:lnSpc>
@@ -2076,7 +2453,7 @@
               </a:lnSpc>
             </a:pPr>
             <a:r>
-              <a:rPr b="1" lang="pt-BR" sz="3600" spc="-1" strike="noStrike">
+              <a:rPr lang="pt-BR" sz="3600" b="1" strike="noStrike" spc="-1">
                 <a:solidFill>
                   <a:srgbClr val="000000"/>
                 </a:solidFill>
@@ -2085,7 +2462,7 @@
               </a:rPr>
               <a:t>Playtesting Math Bullet</a:t>
             </a:r>
-            <a:endParaRPr b="0" lang="pt-BR" sz="3600" spc="-1" strike="noStrike">
+            <a:endParaRPr lang="pt-BR" sz="3600" b="0" strike="noStrike" spc="-1">
               <a:latin typeface="Arial"/>
             </a:endParaRPr>
           </a:p>
@@ -2093,13 +2470,13 @@
       </p:sp>
       <p:pic>
         <p:nvPicPr>
-          <p:cNvPr id="44" name="Imagem 1" descr=""/>
+          <p:cNvPr id="44" name="Imagem 1"/>
           <p:cNvPicPr/>
           <p:nvPr/>
         </p:nvPicPr>
         <p:blipFill>
-          <a:blip r:embed="rId2"/>
-          <a:srcRect l="0" t="23653" r="0" b="0"/>
+          <a:blip r:embed="rId3"/>
+          <a:srcRect t="23653"/>
           <a:stretch/>
         </p:blipFill>
         <p:spPr>
@@ -2117,13 +2494,13 @@
       </p:pic>
       <p:pic>
         <p:nvPicPr>
-          <p:cNvPr id="45" name="Imagem 3" descr=""/>
+          <p:cNvPr id="45" name="Imagem 3"/>
           <p:cNvPicPr/>
           <p:nvPr/>
         </p:nvPicPr>
         <p:blipFill>
-          <a:blip r:embed="rId3"/>
-          <a:srcRect l="0" t="92212" r="0" b="0"/>
+          <a:blip r:embed="rId4"/>
+          <a:srcRect t="92212"/>
           <a:stretch/>
         </p:blipFill>
         <p:spPr>
@@ -2141,6 +2518,9 @@
       </p:pic>
     </p:spTree>
   </p:cSld>
+  <p:clrMapOvr>
+    <a:masterClrMapping/>
+  </p:clrMapOvr>
   <p:timing>
     <p:tnLst>
       <p:par>
@@ -2149,14 +2529,14 @@
             <p:seq>
               <p:cTn id="2" dur="indefinite" nodeType="mainSeq"/>
               <p:prevCondLst>
-                <p:cond delay="0" evt="onPrev">
+                <p:cond evt="onPrev" delay="0">
                   <p:tgtEl>
                     <p:sldTgt/>
                   </p:tgtEl>
                 </p:cond>
               </p:prevCondLst>
               <p:nextCondLst>
-                <p:cond delay="0" evt="onNext">
+                <p:cond evt="onNext" delay="0">
                   <p:tgtEl>
                     <p:sldTgt/>
                   </p:tgtEl>
@@ -2172,7 +2552,7 @@
 </file>
 
 <file path=ppt/slides/slide10.xml><?xml version="1.0" encoding="utf-8"?>
-<p:sld xmlns:a="http://schemas.openxmlformats.org/drawingml/2006/main" xmlns:p="http://schemas.openxmlformats.org/presentationml/2006/main" xmlns:r="http://schemas.openxmlformats.org/officeDocument/2006/relationships" xmlns:p14="http://schemas.microsoft.com/office/powerpoint/2010/main" xmlns:p15="http://schemas.microsoft.com/office/powerpoint/2012/main" xmlns:mc="http://schemas.openxmlformats.org/markup-compatibility/2006">
+<p:sld xmlns:a="http://schemas.openxmlformats.org/drawingml/2006/main" xmlns:r="http://schemas.openxmlformats.org/officeDocument/2006/relationships" xmlns:p="http://schemas.openxmlformats.org/presentationml/2006/main">
   <p:cSld>
     <p:spTree>
       <p:nvGrpSpPr>
@@ -2208,13 +2588,20 @@
           </a:ln>
         </p:spPr>
         <p:style>
-          <a:lnRef idx="0"/>
-          <a:fillRef idx="0"/>
-          <a:effectRef idx="0"/>
+          <a:lnRef idx="0">
+            <a:scrgbClr r="0" g="0" b="0"/>
+          </a:lnRef>
+          <a:fillRef idx="0">
+            <a:scrgbClr r="0" g="0" b="0"/>
+          </a:fillRef>
+          <a:effectRef idx="0">
+            <a:scrgbClr r="0" g="0" b="0"/>
+          </a:effectRef>
           <a:fontRef idx="minor"/>
         </p:style>
         <p:txBody>
-          <a:bodyPr lIns="90000" rIns="90000" tIns="45000" bIns="45000"/>
+          <a:bodyPr lIns="90000" tIns="45000" rIns="90000" bIns="45000"/>
+          <a:lstStyle/>
           <a:p>
             <a:pPr>
               <a:lnSpc>
@@ -2222,7 +2609,7 @@
               </a:lnSpc>
             </a:pPr>
             <a:r>
-              <a:rPr b="1" lang="pt-BR" sz="3600" spc="-1" strike="noStrike">
+              <a:rPr lang="pt-BR" sz="3600" b="1" strike="noStrike" spc="-1">
                 <a:solidFill>
                   <a:srgbClr val="000000"/>
                 </a:solidFill>
@@ -2231,7 +2618,7 @@
               </a:rPr>
               <a:t>Os desafios do jogo foram divertidos de resolver.</a:t>
             </a:r>
-            <a:endParaRPr b="0" lang="pt-BR" sz="3600" spc="-1" strike="noStrike">
+            <a:endParaRPr lang="pt-BR" sz="3600" b="0" strike="noStrike" spc="-1">
               <a:latin typeface="Arial"/>
             </a:endParaRPr>
           </a:p>
@@ -2252,7 +2639,7 @@
             <a:avLst/>
           </a:prstGeom>
           <a:solidFill>
-            <a:srgbClr val="149b55"/>
+            <a:srgbClr val="149B55"/>
           </a:solidFill>
           <a:ln>
             <a:noFill/>
@@ -2275,30 +2662,7 @@
       </p:sp>
       <p:pic>
         <p:nvPicPr>
-          <p:cNvPr id="80" name="Imagem 6" descr=""/>
-          <p:cNvPicPr/>
-          <p:nvPr/>
-        </p:nvPicPr>
-        <p:blipFill>
-          <a:blip r:embed="rId1"/>
-          <a:stretch/>
-        </p:blipFill>
-        <p:spPr>
-          <a:xfrm>
-            <a:off x="286920" y="6381360"/>
-            <a:ext cx="1671840" cy="291240"/>
-          </a:xfrm>
-          <a:prstGeom prst="rect">
-            <a:avLst/>
-          </a:prstGeom>
-          <a:ln>
-            <a:noFill/>
-          </a:ln>
-        </p:spPr>
-      </p:pic>
-      <p:pic>
-        <p:nvPicPr>
-          <p:cNvPr id="81" name="" descr=""/>
+          <p:cNvPr id="80" name="Imagem 6"/>
           <p:cNvPicPr/>
           <p:nvPr/>
         </p:nvPicPr>
@@ -2308,6 +2672,29 @@
         </p:blipFill>
         <p:spPr>
           <a:xfrm>
+            <a:off x="286920" y="6381360"/>
+            <a:ext cx="1671840" cy="291240"/>
+          </a:xfrm>
+          <a:prstGeom prst="rect">
+            <a:avLst/>
+          </a:prstGeom>
+          <a:ln>
+            <a:noFill/>
+          </a:ln>
+        </p:spPr>
+      </p:pic>
+      <p:pic>
+        <p:nvPicPr>
+          <p:cNvPr id="81" name="Imagem 80"/>
+          <p:cNvPicPr/>
+          <p:nvPr/>
+        </p:nvPicPr>
+        <p:blipFill>
+          <a:blip r:embed="rId3"/>
+          <a:stretch/>
+        </p:blipFill>
+        <p:spPr>
+          <a:xfrm>
             <a:off x="446760" y="2197440"/>
             <a:ext cx="8431200" cy="3224880"/>
           </a:xfrm>
@@ -2319,24 +2706,57 @@
           </a:ln>
         </p:spPr>
       </p:pic>
+      <p:sp>
+        <p:nvSpPr>
+          <p:cNvPr id="6" name="CaixaDeTexto 5"/>
+          <p:cNvSpPr txBox="1"/>
+          <p:nvPr/>
+        </p:nvSpPr>
+        <p:spPr>
+          <a:xfrm>
+            <a:off x="3244296" y="5729428"/>
+            <a:ext cx="2655407" cy="369332"/>
+          </a:xfrm>
+          <a:prstGeom prst="rect">
+            <a:avLst/>
+          </a:prstGeom>
+          <a:noFill/>
+        </p:spPr>
+        <p:txBody>
+          <a:bodyPr wrap="none" rtlCol="0">
+            <a:spAutoFit/>
+          </a:bodyPr>
+          <a:lstStyle/>
+          <a:p>
+            <a:r>
+              <a:rPr lang="pt-BR" dirty="0" smtClean="0"/>
+              <a:t>Valor de consenso: 3,38</a:t>
+            </a:r>
+            <a:endParaRPr lang="pt-BR" dirty="0"/>
+          </a:p>
+        </p:txBody>
+      </p:sp>
     </p:spTree>
   </p:cSld>
+  <p:clrMapOvr>
+    <a:masterClrMapping/>
+  </p:clrMapOvr>
   <p:timing>
     <p:tnLst>
       <p:par>
-        <p:cTn id="19" dur="indefinite" restart="never" nodeType="tmRoot">
+        <p:cTn id="1" dur="indefinite" restart="never" nodeType="tmRoot">
           <p:childTnLst>
             <p:seq>
-              <p:cTn id="20" dur="indefinite" nodeType="mainSeq"/>
+              <p:cTn id="2" dur="indefinite" nodeType="mainSeq"/>
               <p:prevCondLst>
-                <p:cond delay="0" evt="onPrev">
+                <p:cond evt="onPrev" delay="0">
                   <p:tgtEl>
                     <p:sldTgt/>
                   </p:tgtEl>
                 </p:cond>
               </p:prevCondLst>
               <p:nextCondLst>
-                <p:cond delay="0" evt="onNext">
+                <p:cond evt="onNext" delay="0">
                   <p:tgtEl>
                     <p:sldTgt/>
                   </p:tgtEl>
@@ -2352,7 +2772,7 @@
 </file>
 
 <file path=ppt/slides/slide11.xml><?xml version="1.0" encoding="utf-8"?>
-<p:sld xmlns:a="http://schemas.openxmlformats.org/drawingml/2006/main" xmlns:p="http://schemas.openxmlformats.org/presentationml/2006/main" xmlns:r="http://schemas.openxmlformats.org/officeDocument/2006/relationships" xmlns:p14="http://schemas.microsoft.com/office/powerpoint/2010/main" xmlns:p15="http://schemas.microsoft.com/office/powerpoint/2012/main" xmlns:mc="http://schemas.openxmlformats.org/markup-compatibility/2006">
+<p:sld xmlns:a="http://schemas.openxmlformats.org/drawingml/2006/main" xmlns:r="http://schemas.openxmlformats.org/officeDocument/2006/relationships" xmlns:p="http://schemas.openxmlformats.org/presentationml/2006/main">
   <p:cSld>
     <p:spTree>
       <p:nvGrpSpPr>
@@ -2388,13 +2808,20 @@
           </a:ln>
         </p:spPr>
         <p:style>
-          <a:lnRef idx="0"/>
-          <a:fillRef idx="0"/>
-          <a:effectRef idx="0"/>
+          <a:lnRef idx="0">
+            <a:scrgbClr r="0" g="0" b="0"/>
+          </a:lnRef>
+          <a:fillRef idx="0">
+            <a:scrgbClr r="0" g="0" b="0"/>
+          </a:fillRef>
+          <a:effectRef idx="0">
+            <a:scrgbClr r="0" g="0" b="0"/>
+          </a:effectRef>
           <a:fontRef idx="minor"/>
         </p:style>
         <p:txBody>
-          <a:bodyPr lIns="90000" rIns="90000" tIns="45000" bIns="45000"/>
+          <a:bodyPr lIns="90000" tIns="45000" rIns="90000" bIns="45000"/>
+          <a:lstStyle/>
           <a:p>
             <a:pPr>
               <a:lnSpc>
@@ -2402,7 +2829,7 @@
               </a:lnSpc>
             </a:pPr>
             <a:r>
-              <a:rPr b="1" lang="pt-BR" sz="3600" spc="-1" strike="noStrike">
+              <a:rPr lang="pt-BR" sz="3600" b="1" strike="noStrike" spc="-1">
                 <a:solidFill>
                   <a:srgbClr val="000000"/>
                 </a:solidFill>
@@ -2411,7 +2838,7 @@
               </a:rPr>
               <a:t>Qual missão você achou mais difícil?</a:t>
             </a:r>
-            <a:endParaRPr b="0" lang="pt-BR" sz="3600" spc="-1" strike="noStrike">
+            <a:endParaRPr lang="pt-BR" sz="3600" b="0" strike="noStrike" spc="-1">
               <a:latin typeface="Arial"/>
             </a:endParaRPr>
           </a:p>
@@ -2432,7 +2859,7 @@
             <a:avLst/>
           </a:prstGeom>
           <a:solidFill>
-            <a:srgbClr val="149b55"/>
+            <a:srgbClr val="149B55"/>
           </a:solidFill>
           <a:ln>
             <a:noFill/>
@@ -2455,30 +2882,7 @@
       </p:sp>
       <p:pic>
         <p:nvPicPr>
-          <p:cNvPr id="84" name="Imagem 6" descr=""/>
-          <p:cNvPicPr/>
-          <p:nvPr/>
-        </p:nvPicPr>
-        <p:blipFill>
-          <a:blip r:embed="rId1"/>
-          <a:stretch/>
-        </p:blipFill>
-        <p:spPr>
-          <a:xfrm>
-            <a:off x="286920" y="6381360"/>
-            <a:ext cx="1671840" cy="291240"/>
-          </a:xfrm>
-          <a:prstGeom prst="rect">
-            <a:avLst/>
-          </a:prstGeom>
-          <a:ln>
-            <a:noFill/>
-          </a:ln>
-        </p:spPr>
-      </p:pic>
-      <p:pic>
-        <p:nvPicPr>
-          <p:cNvPr id="85" name="" descr=""/>
+          <p:cNvPr id="84" name="Imagem 6"/>
           <p:cNvPicPr/>
           <p:nvPr/>
         </p:nvPicPr>
@@ -2488,6 +2892,29 @@
         </p:blipFill>
         <p:spPr>
           <a:xfrm>
+            <a:off x="286920" y="6381360"/>
+            <a:ext cx="1671840" cy="291240"/>
+          </a:xfrm>
+          <a:prstGeom prst="rect">
+            <a:avLst/>
+          </a:prstGeom>
+          <a:ln>
+            <a:noFill/>
+          </a:ln>
+        </p:spPr>
+      </p:pic>
+      <p:pic>
+        <p:nvPicPr>
+          <p:cNvPr id="85" name="Imagem 84"/>
+          <p:cNvPicPr/>
+          <p:nvPr/>
+        </p:nvPicPr>
+        <p:blipFill>
+          <a:blip r:embed="rId3"/>
+          <a:stretch/>
+        </p:blipFill>
+        <p:spPr>
+          <a:xfrm>
             <a:off x="471960" y="2356200"/>
             <a:ext cx="8380440" cy="2907360"/>
           </a:xfrm>
@@ -2501,22 +2928,25 @@
       </p:pic>
     </p:spTree>
   </p:cSld>
+  <p:clrMapOvr>
+    <a:masterClrMapping/>
+  </p:clrMapOvr>
   <p:timing>
     <p:tnLst>
       <p:par>
-        <p:cTn id="21" dur="indefinite" restart="never" nodeType="tmRoot">
+        <p:cTn id="1" dur="indefinite" restart="never" nodeType="tmRoot">
           <p:childTnLst>
             <p:seq>
-              <p:cTn id="22" dur="indefinite" nodeType="mainSeq"/>
+              <p:cTn id="2" dur="indefinite" nodeType="mainSeq"/>
               <p:prevCondLst>
-                <p:cond delay="0" evt="onPrev">
+                <p:cond evt="onPrev" delay="0">
                   <p:tgtEl>
                     <p:sldTgt/>
                   </p:tgtEl>
                 </p:cond>
               </p:prevCondLst>
               <p:nextCondLst>
-                <p:cond delay="0" evt="onNext">
+                <p:cond evt="onNext" delay="0">
                   <p:tgtEl>
                     <p:sldTgt/>
                   </p:tgtEl>
@@ -2532,7 +2962,7 @@
 </file>
 
 <file path=ppt/slides/slide12.xml><?xml version="1.0" encoding="utf-8"?>
-<p:sld xmlns:a="http://schemas.openxmlformats.org/drawingml/2006/main" xmlns:p="http://schemas.openxmlformats.org/presentationml/2006/main" xmlns:r="http://schemas.openxmlformats.org/officeDocument/2006/relationships" xmlns:p14="http://schemas.microsoft.com/office/powerpoint/2010/main" xmlns:p15="http://schemas.microsoft.com/office/powerpoint/2012/main" xmlns:mc="http://schemas.openxmlformats.org/markup-compatibility/2006">
+<p:sld xmlns:a="http://schemas.openxmlformats.org/drawingml/2006/main" xmlns:r="http://schemas.openxmlformats.org/officeDocument/2006/relationships" xmlns:p="http://schemas.openxmlformats.org/presentationml/2006/main">
   <p:cSld>
     <p:spTree>
       <p:nvGrpSpPr>
@@ -2568,13 +2998,20 @@
           </a:ln>
         </p:spPr>
         <p:style>
-          <a:lnRef idx="0"/>
-          <a:fillRef idx="0"/>
-          <a:effectRef idx="0"/>
+          <a:lnRef idx="0">
+            <a:scrgbClr r="0" g="0" b="0"/>
+          </a:lnRef>
+          <a:fillRef idx="0">
+            <a:scrgbClr r="0" g="0" b="0"/>
+          </a:fillRef>
+          <a:effectRef idx="0">
+            <a:scrgbClr r="0" g="0" b="0"/>
+          </a:effectRef>
           <a:fontRef idx="minor"/>
         </p:style>
         <p:txBody>
-          <a:bodyPr lIns="90000" rIns="90000" tIns="45000" bIns="45000"/>
+          <a:bodyPr lIns="90000" tIns="45000" rIns="90000" bIns="45000"/>
+          <a:lstStyle/>
           <a:p>
             <a:pPr>
               <a:lnSpc>
@@ -2582,7 +3019,7 @@
               </a:lnSpc>
             </a:pPr>
             <a:r>
-              <a:rPr b="1" lang="pt-BR" sz="3600" spc="-1" strike="noStrike">
+              <a:rPr lang="pt-BR" sz="3600" b="1" strike="noStrike" spc="-1">
                 <a:solidFill>
                   <a:srgbClr val="000000"/>
                 </a:solidFill>
@@ -2591,7 +3028,7 @@
               </a:rPr>
               <a:t>Que nota você daria para o jogo?</a:t>
             </a:r>
-            <a:endParaRPr b="0" lang="pt-BR" sz="3600" spc="-1" strike="noStrike">
+            <a:endParaRPr lang="pt-BR" sz="3600" b="0" strike="noStrike" spc="-1">
               <a:latin typeface="Arial"/>
             </a:endParaRPr>
           </a:p>
@@ -2612,7 +3049,7 @@
             <a:avLst/>
           </a:prstGeom>
           <a:solidFill>
-            <a:srgbClr val="149b55"/>
+            <a:srgbClr val="149B55"/>
           </a:solidFill>
           <a:ln>
             <a:noFill/>
@@ -2635,30 +3072,7 @@
       </p:sp>
       <p:pic>
         <p:nvPicPr>
-          <p:cNvPr id="88" name="Imagem 6" descr=""/>
-          <p:cNvPicPr/>
-          <p:nvPr/>
-        </p:nvPicPr>
-        <p:blipFill>
-          <a:blip r:embed="rId1"/>
-          <a:stretch/>
-        </p:blipFill>
-        <p:spPr>
-          <a:xfrm>
-            <a:off x="286920" y="6381360"/>
-            <a:ext cx="1671840" cy="291240"/>
-          </a:xfrm>
-          <a:prstGeom prst="rect">
-            <a:avLst/>
-          </a:prstGeom>
-          <a:ln>
-            <a:noFill/>
-          </a:ln>
-        </p:spPr>
-      </p:pic>
-      <p:pic>
-        <p:nvPicPr>
-          <p:cNvPr id="89" name="" descr=""/>
+          <p:cNvPr id="88" name="Imagem 6"/>
           <p:cNvPicPr/>
           <p:nvPr/>
         </p:nvPicPr>
@@ -2668,6 +3082,29 @@
         </p:blipFill>
         <p:spPr>
           <a:xfrm>
+            <a:off x="286920" y="6381360"/>
+            <a:ext cx="1671840" cy="291240"/>
+          </a:xfrm>
+          <a:prstGeom prst="rect">
+            <a:avLst/>
+          </a:prstGeom>
+          <a:ln>
+            <a:noFill/>
+          </a:ln>
+        </p:spPr>
+      </p:pic>
+      <p:pic>
+        <p:nvPicPr>
+          <p:cNvPr id="89" name="Imagem 88"/>
+          <p:cNvPicPr/>
+          <p:nvPr/>
+        </p:nvPicPr>
+        <p:blipFill>
+          <a:blip r:embed="rId3"/>
+          <a:stretch/>
+        </p:blipFill>
+        <p:spPr>
+          <a:xfrm>
             <a:off x="452880" y="2381400"/>
             <a:ext cx="8418600" cy="2856600"/>
           </a:xfrm>
@@ -2681,22 +3118,25 @@
       </p:pic>
     </p:spTree>
   </p:cSld>
+  <p:clrMapOvr>
+    <a:masterClrMapping/>
+  </p:clrMapOvr>
   <p:timing>
     <p:tnLst>
       <p:par>
-        <p:cTn id="23" dur="indefinite" restart="never" nodeType="tmRoot">
+        <p:cTn id="1" dur="indefinite" restart="never" nodeType="tmRoot">
           <p:childTnLst>
             <p:seq>
-              <p:cTn id="24" dur="indefinite" nodeType="mainSeq"/>
+              <p:cTn id="2" dur="indefinite" nodeType="mainSeq"/>
               <p:prevCondLst>
-                <p:cond delay="0" evt="onPrev">
+                <p:cond evt="onPrev" delay="0">
                   <p:tgtEl>
                     <p:sldTgt/>
                   </p:tgtEl>
                 </p:cond>
               </p:prevCondLst>
               <p:nextCondLst>
-                <p:cond delay="0" evt="onNext">
+                <p:cond evt="onNext" delay="0">
                   <p:tgtEl>
                     <p:sldTgt/>
                   </p:tgtEl>
@@ -2712,7 +3152,7 @@
 </file>
 
 <file path=ppt/slides/slide13.xml><?xml version="1.0" encoding="utf-8"?>
-<p:sld xmlns:a="http://schemas.openxmlformats.org/drawingml/2006/main" xmlns:p="http://schemas.openxmlformats.org/presentationml/2006/main" xmlns:r="http://schemas.openxmlformats.org/officeDocument/2006/relationships" xmlns:p14="http://schemas.microsoft.com/office/powerpoint/2010/main" xmlns:p15="http://schemas.microsoft.com/office/powerpoint/2012/main" xmlns:mc="http://schemas.openxmlformats.org/markup-compatibility/2006">
+<p:sld xmlns:a="http://schemas.openxmlformats.org/drawingml/2006/main" xmlns:r="http://schemas.openxmlformats.org/officeDocument/2006/relationships" xmlns:p="http://schemas.openxmlformats.org/presentationml/2006/main">
   <p:cSld>
     <p:spTree>
       <p:nvGrpSpPr>
@@ -2748,13 +3188,20 @@
           </a:ln>
         </p:spPr>
         <p:style>
-          <a:lnRef idx="0"/>
-          <a:fillRef idx="0"/>
-          <a:effectRef idx="0"/>
+          <a:lnRef idx="0">
+            <a:scrgbClr r="0" g="0" b="0"/>
+          </a:lnRef>
+          <a:fillRef idx="0">
+            <a:scrgbClr r="0" g="0" b="0"/>
+          </a:fillRef>
+          <a:effectRef idx="0">
+            <a:scrgbClr r="0" g="0" b="0"/>
+          </a:effectRef>
           <a:fontRef idx="minor"/>
         </p:style>
         <p:txBody>
-          <a:bodyPr lIns="90000" rIns="90000" tIns="45000" bIns="45000"/>
+          <a:bodyPr lIns="90000" tIns="45000" rIns="90000" bIns="45000"/>
+          <a:lstStyle/>
           <a:p>
             <a:pPr>
               <a:lnSpc>
@@ -2762,7 +3209,7 @@
               </a:lnSpc>
             </a:pPr>
             <a:r>
-              <a:rPr b="1" lang="pt-BR" sz="3600" spc="-1" strike="noStrike">
+              <a:rPr lang="pt-BR" sz="3600" b="1" strike="noStrike" spc="-1">
                 <a:solidFill>
                   <a:srgbClr val="000000"/>
                 </a:solidFill>
@@ -2771,7 +3218,7 @@
               </a:rPr>
               <a:t>Você recomendaria esse jogo para algum amigo?</a:t>
             </a:r>
-            <a:endParaRPr b="0" lang="pt-BR" sz="3600" spc="-1" strike="noStrike">
+            <a:endParaRPr lang="pt-BR" sz="3600" b="0" strike="noStrike" spc="-1">
               <a:latin typeface="Arial"/>
             </a:endParaRPr>
           </a:p>
@@ -2792,7 +3239,7 @@
             <a:avLst/>
           </a:prstGeom>
           <a:solidFill>
-            <a:srgbClr val="149b55"/>
+            <a:srgbClr val="149B55"/>
           </a:solidFill>
           <a:ln>
             <a:noFill/>
@@ -2815,30 +3262,7 @@
       </p:sp>
       <p:pic>
         <p:nvPicPr>
-          <p:cNvPr id="92" name="Imagem 6" descr=""/>
-          <p:cNvPicPr/>
-          <p:nvPr/>
-        </p:nvPicPr>
-        <p:blipFill>
-          <a:blip r:embed="rId1"/>
-          <a:stretch/>
-        </p:blipFill>
-        <p:spPr>
-          <a:xfrm>
-            <a:off x="286920" y="6381360"/>
-            <a:ext cx="1671840" cy="291240"/>
-          </a:xfrm>
-          <a:prstGeom prst="rect">
-            <a:avLst/>
-          </a:prstGeom>
-          <a:ln>
-            <a:noFill/>
-          </a:ln>
-        </p:spPr>
-      </p:pic>
-      <p:pic>
-        <p:nvPicPr>
-          <p:cNvPr id="93" name="" descr=""/>
+          <p:cNvPr id="92" name="Imagem 6"/>
           <p:cNvPicPr/>
           <p:nvPr/>
         </p:nvPicPr>
@@ -2848,6 +3272,29 @@
         </p:blipFill>
         <p:spPr>
           <a:xfrm>
+            <a:off x="286920" y="6381360"/>
+            <a:ext cx="1671840" cy="291240"/>
+          </a:xfrm>
+          <a:prstGeom prst="rect">
+            <a:avLst/>
+          </a:prstGeom>
+          <a:ln>
+            <a:noFill/>
+          </a:ln>
+        </p:spPr>
+      </p:pic>
+      <p:pic>
+        <p:nvPicPr>
+          <p:cNvPr id="93" name="Imagem 92"/>
+          <p:cNvPicPr/>
+          <p:nvPr/>
+        </p:nvPicPr>
+        <p:blipFill>
+          <a:blip r:embed="rId3"/>
+          <a:stretch/>
+        </p:blipFill>
+        <p:spPr>
+          <a:xfrm>
             <a:off x="2287800" y="2381400"/>
             <a:ext cx="4748760" cy="2856600"/>
           </a:xfrm>
@@ -2861,22 +3308,25 @@
       </p:pic>
     </p:spTree>
   </p:cSld>
+  <p:clrMapOvr>
+    <a:masterClrMapping/>
+  </p:clrMapOvr>
   <p:timing>
     <p:tnLst>
       <p:par>
-        <p:cTn id="25" dur="indefinite" restart="never" nodeType="tmRoot">
+        <p:cTn id="1" dur="indefinite" restart="never" nodeType="tmRoot">
           <p:childTnLst>
             <p:seq>
-              <p:cTn id="26" dur="indefinite" nodeType="mainSeq"/>
+              <p:cTn id="2" dur="indefinite" nodeType="mainSeq"/>
               <p:prevCondLst>
-                <p:cond delay="0" evt="onPrev">
+                <p:cond evt="onPrev" delay="0">
                   <p:tgtEl>
                     <p:sldTgt/>
                   </p:tgtEl>
                 </p:cond>
               </p:prevCondLst>
               <p:nextCondLst>
-                <p:cond delay="0" evt="onNext">
+                <p:cond evt="onNext" delay="0">
                   <p:tgtEl>
                     <p:sldTgt/>
                   </p:tgtEl>
@@ -2892,7 +3342,7 @@
 </file>
 
 <file path=ppt/slides/slide14.xml><?xml version="1.0" encoding="utf-8"?>
-<p:sld xmlns:a="http://schemas.openxmlformats.org/drawingml/2006/main" xmlns:p="http://schemas.openxmlformats.org/presentationml/2006/main" xmlns:r="http://schemas.openxmlformats.org/officeDocument/2006/relationships" xmlns:p14="http://schemas.microsoft.com/office/powerpoint/2010/main" xmlns:p15="http://schemas.microsoft.com/office/powerpoint/2012/main" xmlns:mc="http://schemas.openxmlformats.org/markup-compatibility/2006">
+<p:sld xmlns:a="http://schemas.openxmlformats.org/drawingml/2006/main" xmlns:r="http://schemas.openxmlformats.org/officeDocument/2006/relationships" xmlns:p="http://schemas.openxmlformats.org/presentationml/2006/main">
   <p:cSld>
     <p:spTree>
       <p:nvGrpSpPr>
@@ -2928,13 +3378,20 @@
           </a:ln>
         </p:spPr>
         <p:style>
-          <a:lnRef idx="0"/>
-          <a:fillRef idx="0"/>
-          <a:effectRef idx="0"/>
+          <a:lnRef idx="0">
+            <a:scrgbClr r="0" g="0" b="0"/>
+          </a:lnRef>
+          <a:fillRef idx="0">
+            <a:scrgbClr r="0" g="0" b="0"/>
+          </a:fillRef>
+          <a:effectRef idx="0">
+            <a:scrgbClr r="0" g="0" b="0"/>
+          </a:effectRef>
           <a:fontRef idx="minor"/>
         </p:style>
         <p:txBody>
-          <a:bodyPr lIns="90000" rIns="90000" tIns="45000" bIns="45000"/>
+          <a:bodyPr lIns="90000" tIns="45000" rIns="90000" bIns="45000"/>
+          <a:lstStyle/>
           <a:p>
             <a:pPr>
               <a:lnSpc>
@@ -2942,7 +3399,7 @@
               </a:lnSpc>
             </a:pPr>
             <a:r>
-              <a:rPr b="1" lang="pt-BR" sz="3600" spc="-1" strike="noStrike">
+              <a:rPr lang="pt-BR" sz="3600" b="1" strike="noStrike" spc="-1">
                 <a:solidFill>
                   <a:srgbClr val="000000"/>
                 </a:solidFill>
@@ -2951,7 +3408,7 @@
               </a:rPr>
               <a:t>Algumas sugestão ou crítica sobre o jogo?</a:t>
             </a:r>
-            <a:endParaRPr b="0" lang="pt-BR" sz="3600" spc="-1" strike="noStrike">
+            <a:endParaRPr lang="pt-BR" sz="3600" b="0" strike="noStrike" spc="-1">
               <a:latin typeface="Arial"/>
             </a:endParaRPr>
           </a:p>
@@ -2972,7 +3429,7 @@
             <a:avLst/>
           </a:prstGeom>
           <a:solidFill>
-            <a:srgbClr val="149b55"/>
+            <a:srgbClr val="149B55"/>
           </a:solidFill>
           <a:ln>
             <a:noFill/>
@@ -2995,30 +3452,7 @@
       </p:sp>
       <p:pic>
         <p:nvPicPr>
-          <p:cNvPr id="96" name="Imagem 6" descr=""/>
-          <p:cNvPicPr/>
-          <p:nvPr/>
-        </p:nvPicPr>
-        <p:blipFill>
-          <a:blip r:embed="rId1"/>
-          <a:stretch/>
-        </p:blipFill>
-        <p:spPr>
-          <a:xfrm>
-            <a:off x="286920" y="6381360"/>
-            <a:ext cx="1671840" cy="291240"/>
-          </a:xfrm>
-          <a:prstGeom prst="rect">
-            <a:avLst/>
-          </a:prstGeom>
-          <a:ln>
-            <a:noFill/>
-          </a:ln>
-        </p:spPr>
-      </p:pic>
-      <p:pic>
-        <p:nvPicPr>
-          <p:cNvPr id="97" name="" descr=""/>
+          <p:cNvPr id="96" name="Imagem 6"/>
           <p:cNvPicPr/>
           <p:nvPr/>
         </p:nvPicPr>
@@ -3028,6 +3462,29 @@
         </p:blipFill>
         <p:spPr>
           <a:xfrm>
+            <a:off x="286920" y="6381360"/>
+            <a:ext cx="1671840" cy="291240"/>
+          </a:xfrm>
+          <a:prstGeom prst="rect">
+            <a:avLst/>
+          </a:prstGeom>
+          <a:ln>
+            <a:noFill/>
+          </a:ln>
+        </p:spPr>
+      </p:pic>
+      <p:pic>
+        <p:nvPicPr>
+          <p:cNvPr id="97" name="Imagem 96"/>
+          <p:cNvPicPr/>
+          <p:nvPr/>
+        </p:nvPicPr>
+        <p:blipFill>
+          <a:blip r:embed="rId3"/>
+          <a:stretch/>
+        </p:blipFill>
+        <p:spPr>
+          <a:xfrm>
             <a:off x="357840" y="1651320"/>
             <a:ext cx="8609040" cy="4316760"/>
           </a:xfrm>
@@ -3041,22 +3498,25 @@
       </p:pic>
     </p:spTree>
   </p:cSld>
+  <p:clrMapOvr>
+    <a:masterClrMapping/>
+  </p:clrMapOvr>
   <p:timing>
     <p:tnLst>
       <p:par>
-        <p:cTn id="27" dur="indefinite" restart="never" nodeType="tmRoot">
+        <p:cTn id="1" dur="indefinite" restart="never" nodeType="tmRoot">
           <p:childTnLst>
             <p:seq>
-              <p:cTn id="28" dur="indefinite" nodeType="mainSeq"/>
+              <p:cTn id="2" dur="indefinite" nodeType="mainSeq"/>
               <p:prevCondLst>
-                <p:cond delay="0" evt="onPrev">
+                <p:cond evt="onPrev" delay="0">
                   <p:tgtEl>
                     <p:sldTgt/>
                   </p:tgtEl>
                 </p:cond>
               </p:prevCondLst>
               <p:nextCondLst>
-                <p:cond delay="0" evt="onNext">
+                <p:cond evt="onNext" delay="0">
                   <p:tgtEl>
                     <p:sldTgt/>
                   </p:tgtEl>
@@ -3072,7 +3532,7 @@
 </file>
 
 <file path=ppt/slides/slide15.xml><?xml version="1.0" encoding="utf-8"?>
-<p:sld xmlns:a="http://schemas.openxmlformats.org/drawingml/2006/main" xmlns:p="http://schemas.openxmlformats.org/presentationml/2006/main" xmlns:r="http://schemas.openxmlformats.org/officeDocument/2006/relationships" xmlns:p14="http://schemas.microsoft.com/office/powerpoint/2010/main" xmlns:p15="http://schemas.microsoft.com/office/powerpoint/2012/main" xmlns:mc="http://schemas.openxmlformats.org/markup-compatibility/2006">
+<p:sld xmlns:a="http://schemas.openxmlformats.org/drawingml/2006/main" xmlns:r="http://schemas.openxmlformats.org/officeDocument/2006/relationships" xmlns:p="http://schemas.openxmlformats.org/presentationml/2006/main">
   <p:cSld>
     <p:spTree>
       <p:nvGrpSpPr>
@@ -3090,12 +3550,12 @@
       </p:grpSpPr>
       <p:pic>
         <p:nvPicPr>
-          <p:cNvPr id="98" name="Imagem 7" descr=""/>
+          <p:cNvPr id="98" name="Imagem 7"/>
           <p:cNvPicPr/>
           <p:nvPr/>
         </p:nvPicPr>
         <p:blipFill>
-          <a:blip r:embed="rId1"/>
+          <a:blip r:embed="rId2"/>
           <a:stretch/>
         </p:blipFill>
         <p:spPr>
@@ -3131,13 +3591,20 @@
           </a:ln>
         </p:spPr>
         <p:style>
-          <a:lnRef idx="0"/>
-          <a:fillRef idx="0"/>
-          <a:effectRef idx="0"/>
+          <a:lnRef idx="0">
+            <a:scrgbClr r="0" g="0" b="0"/>
+          </a:lnRef>
+          <a:fillRef idx="0">
+            <a:scrgbClr r="0" g="0" b="0"/>
+          </a:fillRef>
+          <a:effectRef idx="0">
+            <a:scrgbClr r="0" g="0" b="0"/>
+          </a:effectRef>
           <a:fontRef idx="minor"/>
         </p:style>
         <p:txBody>
-          <a:bodyPr lIns="90000" rIns="90000" tIns="45000" bIns="45000"/>
+          <a:bodyPr lIns="90000" tIns="45000" rIns="90000" bIns="45000"/>
+          <a:lstStyle/>
           <a:p>
             <a:pPr>
               <a:lnSpc>
@@ -3145,7 +3612,7 @@
               </a:lnSpc>
             </a:pPr>
             <a:r>
-              <a:rPr b="1" lang="pt-BR" sz="4000" spc="-1" strike="noStrike">
+              <a:rPr lang="pt-BR" sz="4000" b="1" strike="noStrike" spc="-1">
                 <a:solidFill>
                   <a:srgbClr val="000000"/>
                 </a:solidFill>
@@ -3154,7 +3621,7 @@
               </a:rPr>
               <a:t>Obrigado</a:t>
             </a:r>
-            <a:endParaRPr b="0" lang="pt-BR" sz="4000" spc="-1" strike="noStrike">
+            <a:endParaRPr lang="pt-BR" sz="4000" b="0" strike="noStrike" spc="-1">
               <a:latin typeface="Arial"/>
             </a:endParaRPr>
           </a:p>
@@ -3162,13 +3629,13 @@
       </p:sp>
       <p:pic>
         <p:nvPicPr>
-          <p:cNvPr id="100" name="Imagem 12" descr=""/>
+          <p:cNvPr id="100" name="Imagem 12"/>
           <p:cNvPicPr/>
           <p:nvPr/>
         </p:nvPicPr>
         <p:blipFill>
-          <a:blip r:embed="rId2"/>
-          <a:srcRect l="0" t="23653" r="0" b="0"/>
+          <a:blip r:embed="rId3"/>
+          <a:srcRect t="23653"/>
           <a:stretch/>
         </p:blipFill>
         <p:spPr>
@@ -3186,22 +3653,25 @@
       </p:pic>
     </p:spTree>
   </p:cSld>
+  <p:clrMapOvr>
+    <a:masterClrMapping/>
+  </p:clrMapOvr>
   <p:timing>
     <p:tnLst>
       <p:par>
-        <p:cTn id="29" dur="indefinite" restart="never" nodeType="tmRoot">
+        <p:cTn id="1" dur="indefinite" restart="never" nodeType="tmRoot">
           <p:childTnLst>
             <p:seq>
-              <p:cTn id="30" dur="indefinite" nodeType="mainSeq"/>
+              <p:cTn id="2" dur="indefinite" nodeType="mainSeq"/>
               <p:prevCondLst>
-                <p:cond delay="0" evt="onPrev">
+                <p:cond evt="onPrev" delay="0">
                   <p:tgtEl>
                     <p:sldTgt/>
                   </p:tgtEl>
                 </p:cond>
               </p:prevCondLst>
               <p:nextCondLst>
-                <p:cond delay="0" evt="onNext">
+                <p:cond evt="onNext" delay="0">
                   <p:tgtEl>
                     <p:sldTgt/>
                   </p:tgtEl>
@@ -3217,7 +3687,7 @@
 </file>
 
 <file path=ppt/slides/slide2.xml><?xml version="1.0" encoding="utf-8"?>
-<p:sld xmlns:a="http://schemas.openxmlformats.org/drawingml/2006/main" xmlns:p="http://schemas.openxmlformats.org/presentationml/2006/main" xmlns:r="http://schemas.openxmlformats.org/officeDocument/2006/relationships" xmlns:p14="http://schemas.microsoft.com/office/powerpoint/2010/main" xmlns:p15="http://schemas.microsoft.com/office/powerpoint/2012/main" xmlns:mc="http://schemas.openxmlformats.org/markup-compatibility/2006">
+<p:sld xmlns:a="http://schemas.openxmlformats.org/drawingml/2006/main" xmlns:r="http://schemas.openxmlformats.org/officeDocument/2006/relationships" xmlns:p="http://schemas.openxmlformats.org/presentationml/2006/main">
   <p:cSld>
     <p:spTree>
       <p:nvGrpSpPr>
@@ -3253,13 +3723,20 @@
           </a:ln>
         </p:spPr>
         <p:style>
-          <a:lnRef idx="0"/>
-          <a:fillRef idx="0"/>
-          <a:effectRef idx="0"/>
+          <a:lnRef idx="0">
+            <a:scrgbClr r="0" g="0" b="0"/>
+          </a:lnRef>
+          <a:fillRef idx="0">
+            <a:scrgbClr r="0" g="0" b="0"/>
+          </a:fillRef>
+          <a:effectRef idx="0">
+            <a:scrgbClr r="0" g="0" b="0"/>
+          </a:effectRef>
           <a:fontRef idx="minor"/>
         </p:style>
         <p:txBody>
-          <a:bodyPr lIns="90000" rIns="90000" tIns="45000" bIns="45000"/>
+          <a:bodyPr lIns="90000" tIns="45000" rIns="90000" bIns="45000"/>
+          <a:lstStyle/>
           <a:p>
             <a:pPr>
               <a:lnSpc>
@@ -3267,7 +3744,7 @@
               </a:lnSpc>
             </a:pPr>
             <a:r>
-              <a:rPr b="1" lang="pt-BR" sz="3600" spc="-1" strike="noStrike">
+              <a:rPr lang="pt-BR" sz="3600" b="1" strike="noStrike" spc="-1">
                 <a:solidFill>
                   <a:srgbClr val="000000"/>
                 </a:solidFill>
@@ -3276,7 +3753,7 @@
               </a:rPr>
               <a:t>Você já tinha jogado outros jogos educacionais sobre matemática? </a:t>
             </a:r>
-            <a:endParaRPr b="0" lang="pt-BR" sz="3600" spc="-1" strike="noStrike">
+            <a:endParaRPr lang="pt-BR" sz="3600" b="0" strike="noStrike" spc="-1">
               <a:latin typeface="Arial"/>
             </a:endParaRPr>
           </a:p>
@@ -3297,7 +3774,7 @@
             <a:avLst/>
           </a:prstGeom>
           <a:solidFill>
-            <a:srgbClr val="149b55"/>
+            <a:srgbClr val="149B55"/>
           </a:solidFill>
           <a:ln>
             <a:noFill/>
@@ -3320,30 +3797,7 @@
       </p:sp>
       <p:pic>
         <p:nvPicPr>
-          <p:cNvPr id="48" name="Imagem 6" descr=""/>
-          <p:cNvPicPr/>
-          <p:nvPr/>
-        </p:nvPicPr>
-        <p:blipFill>
-          <a:blip r:embed="rId1"/>
-          <a:stretch/>
-        </p:blipFill>
-        <p:spPr>
-          <a:xfrm>
-            <a:off x="286920" y="6381360"/>
-            <a:ext cx="1671840" cy="291240"/>
-          </a:xfrm>
-          <a:prstGeom prst="rect">
-            <a:avLst/>
-          </a:prstGeom>
-          <a:ln>
-            <a:noFill/>
-          </a:ln>
-        </p:spPr>
-      </p:pic>
-      <p:pic>
-        <p:nvPicPr>
-          <p:cNvPr id="49" name="" descr=""/>
+          <p:cNvPr id="48" name="Imagem 6"/>
           <p:cNvPicPr/>
           <p:nvPr/>
         </p:nvPicPr>
@@ -3353,6 +3807,29 @@
         </p:blipFill>
         <p:spPr>
           <a:xfrm>
+            <a:off x="286920" y="6381360"/>
+            <a:ext cx="1671840" cy="291240"/>
+          </a:xfrm>
+          <a:prstGeom prst="rect">
+            <a:avLst/>
+          </a:prstGeom>
+          <a:ln>
+            <a:noFill/>
+          </a:ln>
+        </p:spPr>
+      </p:pic>
+      <p:pic>
+        <p:nvPicPr>
+          <p:cNvPr id="49" name="Imagem 48"/>
+          <p:cNvPicPr/>
+          <p:nvPr/>
+        </p:nvPicPr>
+        <p:blipFill>
+          <a:blip r:embed="rId3"/>
+          <a:stretch/>
+        </p:blipFill>
+        <p:spPr>
+          <a:xfrm>
             <a:off x="2319840" y="2304000"/>
             <a:ext cx="4520160" cy="3034440"/>
           </a:xfrm>
@@ -3366,22 +3843,25 @@
       </p:pic>
     </p:spTree>
   </p:cSld>
+  <p:clrMapOvr>
+    <a:masterClrMapping/>
+  </p:clrMapOvr>
   <p:timing>
     <p:tnLst>
       <p:par>
-        <p:cTn id="3" dur="indefinite" restart="never" nodeType="tmRoot">
+        <p:cTn id="1" dur="indefinite" restart="never" nodeType="tmRoot">
           <p:childTnLst>
             <p:seq>
-              <p:cTn id="4" dur="indefinite" nodeType="mainSeq"/>
+              <p:cTn id="2" dur="indefinite" nodeType="mainSeq"/>
               <p:prevCondLst>
-                <p:cond delay="0" evt="onPrev">
+                <p:cond evt="onPrev" delay="0">
                   <p:tgtEl>
                     <p:sldTgt/>
                   </p:tgtEl>
                 </p:cond>
               </p:prevCondLst>
               <p:nextCondLst>
-                <p:cond delay="0" evt="onNext">
+                <p:cond evt="onNext" delay="0">
                   <p:tgtEl>
                     <p:sldTgt/>
                   </p:tgtEl>
@@ -3397,7 +3877,7 @@
 </file>
 
 <file path=ppt/slides/slide3.xml><?xml version="1.0" encoding="utf-8"?>
-<p:sld xmlns:a="http://schemas.openxmlformats.org/drawingml/2006/main" xmlns:p="http://schemas.openxmlformats.org/presentationml/2006/main" xmlns:r="http://schemas.openxmlformats.org/officeDocument/2006/relationships" xmlns:p14="http://schemas.microsoft.com/office/powerpoint/2010/main" xmlns:p15="http://schemas.microsoft.com/office/powerpoint/2012/main" xmlns:mc="http://schemas.openxmlformats.org/markup-compatibility/2006">
+<p:sld xmlns:a="http://schemas.openxmlformats.org/drawingml/2006/main" xmlns:r="http://schemas.openxmlformats.org/officeDocument/2006/relationships" xmlns:p="http://schemas.openxmlformats.org/presentationml/2006/main">
   <p:cSld>
     <p:spTree>
       <p:nvGrpSpPr>
@@ -3433,13 +3913,20 @@
           </a:ln>
         </p:spPr>
         <p:style>
-          <a:lnRef idx="0"/>
-          <a:fillRef idx="0"/>
-          <a:effectRef idx="0"/>
+          <a:lnRef idx="0">
+            <a:scrgbClr r="0" g="0" b="0"/>
+          </a:lnRef>
+          <a:fillRef idx="0">
+            <a:scrgbClr r="0" g="0" b="0"/>
+          </a:fillRef>
+          <a:effectRef idx="0">
+            <a:scrgbClr r="0" g="0" b="0"/>
+          </a:effectRef>
           <a:fontRef idx="minor"/>
         </p:style>
         <p:txBody>
-          <a:bodyPr lIns="90000" rIns="90000" tIns="45000" bIns="45000"/>
+          <a:bodyPr lIns="90000" tIns="45000" rIns="90000" bIns="45000"/>
+          <a:lstStyle/>
           <a:p>
             <a:pPr>
               <a:lnSpc>
@@ -3447,7 +3934,7 @@
               </a:lnSpc>
             </a:pPr>
             <a:r>
-              <a:rPr b="1" lang="pt-BR" sz="3600" spc="-1" strike="noStrike">
+              <a:rPr lang="pt-BR" sz="3600" b="1" strike="noStrike" spc="-1">
                 <a:solidFill>
                   <a:srgbClr val="000000"/>
                 </a:solidFill>
@@ -3456,7 +3943,7 @@
               </a:rPr>
               <a:t>Sempre tive controle sobre as minhas interações no jogo.</a:t>
             </a:r>
-            <a:endParaRPr b="0" lang="pt-BR" sz="3600" spc="-1" strike="noStrike">
+            <a:endParaRPr lang="pt-BR" sz="3600" b="0" strike="noStrike" spc="-1">
               <a:latin typeface="Arial"/>
             </a:endParaRPr>
           </a:p>
@@ -3477,7 +3964,7 @@
             <a:avLst/>
           </a:prstGeom>
           <a:solidFill>
-            <a:srgbClr val="149b55"/>
+            <a:srgbClr val="149B55"/>
           </a:solidFill>
           <a:ln>
             <a:noFill/>
@@ -3500,30 +3987,7 @@
       </p:sp>
       <p:pic>
         <p:nvPicPr>
-          <p:cNvPr id="52" name="Imagem 6" descr=""/>
-          <p:cNvPicPr/>
-          <p:nvPr/>
-        </p:nvPicPr>
-        <p:blipFill>
-          <a:blip r:embed="rId1"/>
-          <a:stretch/>
-        </p:blipFill>
-        <p:spPr>
-          <a:xfrm>
-            <a:off x="286920" y="6381360"/>
-            <a:ext cx="1671840" cy="291240"/>
-          </a:xfrm>
-          <a:prstGeom prst="rect">
-            <a:avLst/>
-          </a:prstGeom>
-          <a:ln>
-            <a:noFill/>
-          </a:ln>
-        </p:spPr>
-      </p:pic>
-      <p:pic>
-        <p:nvPicPr>
-          <p:cNvPr id="53" name="" descr=""/>
+          <p:cNvPr id="52" name="Imagem 6"/>
           <p:cNvPicPr/>
           <p:nvPr/>
         </p:nvPicPr>
@@ -3533,6 +3997,29 @@
         </p:blipFill>
         <p:spPr>
           <a:xfrm>
+            <a:off x="286920" y="6381360"/>
+            <a:ext cx="1671840" cy="291240"/>
+          </a:xfrm>
+          <a:prstGeom prst="rect">
+            <a:avLst/>
+          </a:prstGeom>
+          <a:ln>
+            <a:noFill/>
+          </a:ln>
+        </p:spPr>
+      </p:pic>
+      <p:pic>
+        <p:nvPicPr>
+          <p:cNvPr id="53" name="Imagem 52"/>
+          <p:cNvPicPr/>
+          <p:nvPr/>
+        </p:nvPicPr>
+        <p:blipFill>
+          <a:blip r:embed="rId3"/>
+          <a:stretch/>
+        </p:blipFill>
+        <p:spPr>
+          <a:xfrm>
             <a:off x="433800" y="2023920"/>
             <a:ext cx="8456760" cy="2894760"/>
           </a:xfrm>
@@ -3544,24 +4031,57 @@
           </a:ln>
         </p:spPr>
       </p:pic>
+      <p:sp>
+        <p:nvSpPr>
+          <p:cNvPr id="2" name="CaixaDeTexto 1"/>
+          <p:cNvSpPr txBox="1"/>
+          <p:nvPr/>
+        </p:nvSpPr>
+        <p:spPr>
+          <a:xfrm>
+            <a:off x="3334476" y="5280688"/>
+            <a:ext cx="2655407" cy="369332"/>
+          </a:xfrm>
+          <a:prstGeom prst="rect">
+            <a:avLst/>
+          </a:prstGeom>
+          <a:noFill/>
+        </p:spPr>
+        <p:txBody>
+          <a:bodyPr wrap="none" rtlCol="0">
+            <a:spAutoFit/>
+          </a:bodyPr>
+          <a:lstStyle/>
+          <a:p>
+            <a:r>
+              <a:rPr lang="pt-BR" dirty="0" smtClean="0"/>
+              <a:t>Valor de consenso: 4,05</a:t>
+            </a:r>
+            <a:endParaRPr lang="pt-BR" dirty="0"/>
+          </a:p>
+        </p:txBody>
+      </p:sp>
     </p:spTree>
   </p:cSld>
+  <p:clrMapOvr>
+    <a:masterClrMapping/>
+  </p:clrMapOvr>
   <p:timing>
     <p:tnLst>
       <p:par>
-        <p:cTn id="5" dur="indefinite" restart="never" nodeType="tmRoot">
+        <p:cTn id="1" dur="indefinite" restart="never" nodeType="tmRoot">
           <p:childTnLst>
             <p:seq>
-              <p:cTn id="6" dur="indefinite" nodeType="mainSeq"/>
+              <p:cTn id="2" dur="indefinite" nodeType="mainSeq"/>
               <p:prevCondLst>
-                <p:cond delay="0" evt="onPrev">
+                <p:cond evt="onPrev" delay="0">
                   <p:tgtEl>
                     <p:sldTgt/>
                   </p:tgtEl>
                 </p:cond>
               </p:prevCondLst>
               <p:nextCondLst>
-                <p:cond delay="0" evt="onNext">
+                <p:cond evt="onNext" delay="0">
                   <p:tgtEl>
                     <p:sldTgt/>
                   </p:tgtEl>
@@ -3577,7 +4097,7 @@
 </file>
 
 <file path=ppt/slides/slide4.xml><?xml version="1.0" encoding="utf-8"?>
-<p:sld xmlns:a="http://schemas.openxmlformats.org/drawingml/2006/main" xmlns:p="http://schemas.openxmlformats.org/presentationml/2006/main" xmlns:r="http://schemas.openxmlformats.org/officeDocument/2006/relationships" xmlns:p14="http://schemas.microsoft.com/office/powerpoint/2010/main" xmlns:p15="http://schemas.microsoft.com/office/powerpoint/2012/main" xmlns:mc="http://schemas.openxmlformats.org/markup-compatibility/2006">
+<p:sld xmlns:a="http://schemas.openxmlformats.org/drawingml/2006/main" xmlns:r="http://schemas.openxmlformats.org/officeDocument/2006/relationships" xmlns:p="http://schemas.openxmlformats.org/presentationml/2006/main">
   <p:cSld>
     <p:spTree>
       <p:nvGrpSpPr>
@@ -3613,13 +4133,20 @@
           </a:ln>
         </p:spPr>
         <p:style>
-          <a:lnRef idx="0"/>
-          <a:fillRef idx="0"/>
-          <a:effectRef idx="0"/>
+          <a:lnRef idx="0">
+            <a:scrgbClr r="0" g="0" b="0"/>
+          </a:lnRef>
+          <a:fillRef idx="0">
+            <a:scrgbClr r="0" g="0" b="0"/>
+          </a:fillRef>
+          <a:effectRef idx="0">
+            <a:scrgbClr r="0" g="0" b="0"/>
+          </a:effectRef>
           <a:fontRef idx="minor"/>
         </p:style>
         <p:txBody>
-          <a:bodyPr lIns="90000" rIns="90000" tIns="45000" bIns="45000"/>
+          <a:bodyPr lIns="90000" tIns="45000" rIns="90000" bIns="45000"/>
+          <a:lstStyle/>
           <a:p>
             <a:pPr>
               <a:lnSpc>
@@ -3627,7 +4154,7 @@
               </a:lnSpc>
             </a:pPr>
             <a:r>
-              <a:rPr b="1" lang="pt-BR" sz="3600" spc="-1" strike="noStrike">
+              <a:rPr lang="pt-BR" sz="3600" b="1" strike="noStrike" spc="-1">
                 <a:solidFill>
                   <a:srgbClr val="000000"/>
                 </a:solidFill>
@@ -3636,7 +4163,7 @@
               </a:rPr>
               <a:t>Os controles do jogo foram confortáveis de jogar.</a:t>
             </a:r>
-            <a:endParaRPr b="0" lang="pt-BR" sz="3600" spc="-1" strike="noStrike">
+            <a:endParaRPr lang="pt-BR" sz="3600" b="0" strike="noStrike" spc="-1">
               <a:latin typeface="Arial"/>
             </a:endParaRPr>
           </a:p>
@@ -3657,7 +4184,7 @@
             <a:avLst/>
           </a:prstGeom>
           <a:solidFill>
-            <a:srgbClr val="149b55"/>
+            <a:srgbClr val="149B55"/>
           </a:solidFill>
           <a:ln>
             <a:noFill/>
@@ -3680,30 +4207,7 @@
       </p:sp>
       <p:pic>
         <p:nvPicPr>
-          <p:cNvPr id="56" name="Imagem 6" descr=""/>
-          <p:cNvPicPr/>
-          <p:nvPr/>
-        </p:nvPicPr>
-        <p:blipFill>
-          <a:blip r:embed="rId1"/>
-          <a:stretch/>
-        </p:blipFill>
-        <p:spPr>
-          <a:xfrm>
-            <a:off x="286920" y="6381360"/>
-            <a:ext cx="1671840" cy="291240"/>
-          </a:xfrm>
-          <a:prstGeom prst="rect">
-            <a:avLst/>
-          </a:prstGeom>
-          <a:ln>
-            <a:noFill/>
-          </a:ln>
-        </p:spPr>
-      </p:pic>
-      <p:pic>
-        <p:nvPicPr>
-          <p:cNvPr id="57" name="" descr=""/>
+          <p:cNvPr id="56" name="Imagem 6"/>
           <p:cNvPicPr/>
           <p:nvPr/>
         </p:nvPicPr>
@@ -3713,6 +4217,29 @@
         </p:blipFill>
         <p:spPr>
           <a:xfrm>
+            <a:off x="286920" y="6381360"/>
+            <a:ext cx="1671840" cy="291240"/>
+          </a:xfrm>
+          <a:prstGeom prst="rect">
+            <a:avLst/>
+          </a:prstGeom>
+          <a:ln>
+            <a:noFill/>
+          </a:ln>
+        </p:spPr>
+      </p:pic>
+      <p:pic>
+        <p:nvPicPr>
+          <p:cNvPr id="57" name="Imagem 56"/>
+          <p:cNvPicPr/>
+          <p:nvPr/>
+        </p:nvPicPr>
+        <p:blipFill>
+          <a:blip r:embed="rId3"/>
+          <a:stretch/>
+        </p:blipFill>
+        <p:spPr>
+          <a:xfrm>
             <a:off x="376920" y="2036880"/>
             <a:ext cx="8570880" cy="2869200"/>
           </a:xfrm>
@@ -3724,24 +4251,57 @@
           </a:ln>
         </p:spPr>
       </p:pic>
+      <p:sp>
+        <p:nvSpPr>
+          <p:cNvPr id="6" name="CaixaDeTexto 5"/>
+          <p:cNvSpPr txBox="1"/>
+          <p:nvPr/>
+        </p:nvSpPr>
+        <p:spPr>
+          <a:xfrm>
+            <a:off x="3334476" y="5280688"/>
+            <a:ext cx="2655407" cy="369332"/>
+          </a:xfrm>
+          <a:prstGeom prst="rect">
+            <a:avLst/>
+          </a:prstGeom>
+          <a:noFill/>
+        </p:spPr>
+        <p:txBody>
+          <a:bodyPr wrap="none" rtlCol="0">
+            <a:spAutoFit/>
+          </a:bodyPr>
+          <a:lstStyle/>
+          <a:p>
+            <a:r>
+              <a:rPr lang="pt-BR" dirty="0" smtClean="0"/>
+              <a:t>Valor de consenso: 3,24</a:t>
+            </a:r>
+            <a:endParaRPr lang="pt-BR" dirty="0"/>
+          </a:p>
+        </p:txBody>
+      </p:sp>
     </p:spTree>
   </p:cSld>
+  <p:clrMapOvr>
+    <a:masterClrMapping/>
+  </p:clrMapOvr>
   <p:timing>
     <p:tnLst>
       <p:par>
-        <p:cTn id="7" dur="indefinite" restart="never" nodeType="tmRoot">
+        <p:cTn id="1" dur="indefinite" restart="never" nodeType="tmRoot">
           <p:childTnLst>
             <p:seq>
-              <p:cTn id="8" dur="indefinite" nodeType="mainSeq"/>
+              <p:cTn id="2" dur="indefinite" nodeType="mainSeq"/>
               <p:prevCondLst>
-                <p:cond delay="0" evt="onPrev">
+                <p:cond evt="onPrev" delay="0">
                   <p:tgtEl>
                     <p:sldTgt/>
                   </p:tgtEl>
                 </p:cond>
               </p:prevCondLst>
               <p:nextCondLst>
-                <p:cond delay="0" evt="onNext">
+                <p:cond evt="onNext" delay="0">
                   <p:tgtEl>
                     <p:sldTgt/>
                   </p:tgtEl>
@@ -3757,7 +4317,7 @@
 </file>
 
 <file path=ppt/slides/slide5.xml><?xml version="1.0" encoding="utf-8"?>
-<p:sld xmlns:a="http://schemas.openxmlformats.org/drawingml/2006/main" xmlns:p="http://schemas.openxmlformats.org/presentationml/2006/main" xmlns:r="http://schemas.openxmlformats.org/officeDocument/2006/relationships" xmlns:p14="http://schemas.microsoft.com/office/powerpoint/2010/main" xmlns:p15="http://schemas.microsoft.com/office/powerpoint/2012/main" xmlns:mc="http://schemas.openxmlformats.org/markup-compatibility/2006">
+<p:sld xmlns:a="http://schemas.openxmlformats.org/drawingml/2006/main" xmlns:r="http://schemas.openxmlformats.org/officeDocument/2006/relationships" xmlns:p="http://schemas.openxmlformats.org/presentationml/2006/main">
   <p:cSld>
     <p:spTree>
       <p:nvGrpSpPr>
@@ -3793,13 +4353,20 @@
           </a:ln>
         </p:spPr>
         <p:style>
-          <a:lnRef idx="0"/>
-          <a:fillRef idx="0"/>
-          <a:effectRef idx="0"/>
+          <a:lnRef idx="0">
+            <a:scrgbClr r="0" g="0" b="0"/>
+          </a:lnRef>
+          <a:fillRef idx="0">
+            <a:scrgbClr r="0" g="0" b="0"/>
+          </a:fillRef>
+          <a:effectRef idx="0">
+            <a:scrgbClr r="0" g="0" b="0"/>
+          </a:effectRef>
           <a:fontRef idx="minor"/>
         </p:style>
         <p:txBody>
-          <a:bodyPr lIns="90000" rIns="90000" tIns="45000" bIns="45000"/>
+          <a:bodyPr lIns="90000" tIns="45000" rIns="90000" bIns="45000"/>
+          <a:lstStyle/>
           <a:p>
             <a:pPr>
               <a:lnSpc>
@@ -3807,7 +4374,7 @@
               </a:lnSpc>
             </a:pPr>
             <a:r>
-              <a:rPr b="1" lang="pt-BR" sz="3600" spc="-1" strike="noStrike">
+              <a:rPr lang="pt-BR" sz="3600" b="1" strike="noStrike" spc="-1">
                 <a:solidFill>
                   <a:srgbClr val="000000"/>
                 </a:solidFill>
@@ -3816,7 +4383,7 @@
               </a:rPr>
               <a:t>Percebi o objetivo principal do jogo no inicio do jogo.</a:t>
             </a:r>
-            <a:endParaRPr b="0" lang="pt-BR" sz="3600" spc="-1" strike="noStrike">
+            <a:endParaRPr lang="pt-BR" sz="3600" b="0" strike="noStrike" spc="-1">
               <a:latin typeface="Arial"/>
             </a:endParaRPr>
           </a:p>
@@ -3837,7 +4404,7 @@
             <a:avLst/>
           </a:prstGeom>
           <a:solidFill>
-            <a:srgbClr val="149b55"/>
+            <a:srgbClr val="149B55"/>
           </a:solidFill>
           <a:ln>
             <a:noFill/>
@@ -3860,30 +4427,7 @@
       </p:sp>
       <p:pic>
         <p:nvPicPr>
-          <p:cNvPr id="60" name="Imagem 6" descr=""/>
-          <p:cNvPicPr/>
-          <p:nvPr/>
-        </p:nvPicPr>
-        <p:blipFill>
-          <a:blip r:embed="rId1"/>
-          <a:stretch/>
-        </p:blipFill>
-        <p:spPr>
-          <a:xfrm>
-            <a:off x="286920" y="6381360"/>
-            <a:ext cx="1671840" cy="291240"/>
-          </a:xfrm>
-          <a:prstGeom prst="rect">
-            <a:avLst/>
-          </a:prstGeom>
-          <a:ln>
-            <a:noFill/>
-          </a:ln>
-        </p:spPr>
-      </p:pic>
-      <p:pic>
-        <p:nvPicPr>
-          <p:cNvPr id="61" name="" descr=""/>
+          <p:cNvPr id="60" name="Imagem 6"/>
           <p:cNvPicPr/>
           <p:nvPr/>
         </p:nvPicPr>
@@ -3893,6 +4437,29 @@
         </p:blipFill>
         <p:spPr>
           <a:xfrm>
+            <a:off x="286920" y="6381360"/>
+            <a:ext cx="1671840" cy="291240"/>
+          </a:xfrm>
+          <a:prstGeom prst="rect">
+            <a:avLst/>
+          </a:prstGeom>
+          <a:ln>
+            <a:noFill/>
+          </a:ln>
+        </p:spPr>
+      </p:pic>
+      <p:pic>
+        <p:nvPicPr>
+          <p:cNvPr id="61" name="Imagem 60"/>
+          <p:cNvPicPr/>
+          <p:nvPr/>
+        </p:nvPicPr>
+        <p:blipFill>
+          <a:blip r:embed="rId3"/>
+          <a:stretch/>
+        </p:blipFill>
+        <p:spPr>
+          <a:xfrm>
             <a:off x="389520" y="1909800"/>
             <a:ext cx="8545320" cy="3123360"/>
           </a:xfrm>
@@ -3904,24 +4471,57 @@
           </a:ln>
         </p:spPr>
       </p:pic>
+      <p:sp>
+        <p:nvSpPr>
+          <p:cNvPr id="6" name="CaixaDeTexto 5"/>
+          <p:cNvSpPr txBox="1"/>
+          <p:nvPr/>
+        </p:nvSpPr>
+        <p:spPr>
+          <a:xfrm>
+            <a:off x="3334476" y="5280688"/>
+            <a:ext cx="2655407" cy="369332"/>
+          </a:xfrm>
+          <a:prstGeom prst="rect">
+            <a:avLst/>
+          </a:prstGeom>
+          <a:noFill/>
+        </p:spPr>
+        <p:txBody>
+          <a:bodyPr wrap="none" rtlCol="0">
+            <a:spAutoFit/>
+          </a:bodyPr>
+          <a:lstStyle/>
+          <a:p>
+            <a:r>
+              <a:rPr lang="pt-BR" dirty="0" smtClean="0"/>
+              <a:t>Valor de consenso: 4,50</a:t>
+            </a:r>
+            <a:endParaRPr lang="pt-BR" dirty="0"/>
+          </a:p>
+        </p:txBody>
+      </p:sp>
     </p:spTree>
   </p:cSld>
+  <p:clrMapOvr>
+    <a:masterClrMapping/>
+  </p:clrMapOvr>
   <p:timing>
     <p:tnLst>
       <p:par>
-        <p:cTn id="9" dur="indefinite" restart="never" nodeType="tmRoot">
+        <p:cTn id="1" dur="indefinite" restart="never" nodeType="tmRoot">
           <p:childTnLst>
             <p:seq>
-              <p:cTn id="10" dur="indefinite" nodeType="mainSeq"/>
+              <p:cTn id="2" dur="indefinite" nodeType="mainSeq"/>
               <p:prevCondLst>
-                <p:cond delay="0" evt="onPrev">
+                <p:cond evt="onPrev" delay="0">
                   <p:tgtEl>
                     <p:sldTgt/>
                   </p:tgtEl>
                 </p:cond>
               </p:prevCondLst>
               <p:nextCondLst>
-                <p:cond delay="0" evt="onNext">
+                <p:cond evt="onNext" delay="0">
                   <p:tgtEl>
                     <p:sldTgt/>
                   </p:tgtEl>
@@ -3937,7 +4537,7 @@
 </file>
 
 <file path=ppt/slides/slide6.xml><?xml version="1.0" encoding="utf-8"?>
-<p:sld xmlns:a="http://schemas.openxmlformats.org/drawingml/2006/main" xmlns:p="http://schemas.openxmlformats.org/presentationml/2006/main" xmlns:r="http://schemas.openxmlformats.org/officeDocument/2006/relationships" xmlns:p14="http://schemas.microsoft.com/office/powerpoint/2010/main" xmlns:p15="http://schemas.microsoft.com/office/powerpoint/2012/main" xmlns:mc="http://schemas.openxmlformats.org/markup-compatibility/2006">
+<p:sld xmlns:a="http://schemas.openxmlformats.org/drawingml/2006/main" xmlns:r="http://schemas.openxmlformats.org/officeDocument/2006/relationships" xmlns:p="http://schemas.openxmlformats.org/presentationml/2006/main">
   <p:cSld>
     <p:spTree>
       <p:nvGrpSpPr>
@@ -3973,13 +4573,20 @@
           </a:ln>
         </p:spPr>
         <p:style>
-          <a:lnRef idx="0"/>
-          <a:fillRef idx="0"/>
-          <a:effectRef idx="0"/>
+          <a:lnRef idx="0">
+            <a:scrgbClr r="0" g="0" b="0"/>
+          </a:lnRef>
+          <a:fillRef idx="0">
+            <a:scrgbClr r="0" g="0" b="0"/>
+          </a:fillRef>
+          <a:effectRef idx="0">
+            <a:scrgbClr r="0" g="0" b="0"/>
+          </a:effectRef>
           <a:fontRef idx="minor"/>
         </p:style>
         <p:txBody>
-          <a:bodyPr lIns="90000" rIns="90000" tIns="45000" bIns="45000"/>
+          <a:bodyPr lIns="90000" tIns="45000" rIns="90000" bIns="45000"/>
+          <a:lstStyle/>
           <a:p>
             <a:pPr>
               <a:lnSpc>
@@ -3987,7 +4594,7 @@
               </a:lnSpc>
             </a:pPr>
             <a:r>
-              <a:rPr b="1" lang="pt-BR" sz="3600" spc="-1" strike="noStrike">
+              <a:rPr lang="pt-BR" sz="3600" b="1" strike="noStrike" spc="-1">
                 <a:solidFill>
                   <a:srgbClr val="000000"/>
                 </a:solidFill>
@@ -3996,7 +4603,7 @@
               </a:rPr>
               <a:t>Tive informações sobre o meu progresso no jogo enquanto jogava.</a:t>
             </a:r>
-            <a:endParaRPr b="0" lang="pt-BR" sz="3600" spc="-1" strike="noStrike">
+            <a:endParaRPr lang="pt-BR" sz="3600" b="0" strike="noStrike" spc="-1">
               <a:latin typeface="Arial"/>
             </a:endParaRPr>
           </a:p>
@@ -4017,7 +4624,7 @@
             <a:avLst/>
           </a:prstGeom>
           <a:solidFill>
-            <a:srgbClr val="149b55"/>
+            <a:srgbClr val="149B55"/>
           </a:solidFill>
           <a:ln>
             <a:noFill/>
@@ -4040,30 +4647,7 @@
       </p:sp>
       <p:pic>
         <p:nvPicPr>
-          <p:cNvPr id="64" name="Imagem 6" descr=""/>
-          <p:cNvPicPr/>
-          <p:nvPr/>
-        </p:nvPicPr>
-        <p:blipFill>
-          <a:blip r:embed="rId1"/>
-          <a:stretch/>
-        </p:blipFill>
-        <p:spPr>
-          <a:xfrm>
-            <a:off x="286920" y="6381360"/>
-            <a:ext cx="1671840" cy="291240"/>
-          </a:xfrm>
-          <a:prstGeom prst="rect">
-            <a:avLst/>
-          </a:prstGeom>
-          <a:ln>
-            <a:noFill/>
-          </a:ln>
-        </p:spPr>
-      </p:pic>
-      <p:pic>
-        <p:nvPicPr>
-          <p:cNvPr id="65" name="" descr=""/>
+          <p:cNvPr id="64" name="Imagem 6"/>
           <p:cNvPicPr/>
           <p:nvPr/>
         </p:nvPicPr>
@@ -4073,6 +4657,29 @@
         </p:blipFill>
         <p:spPr>
           <a:xfrm>
+            <a:off x="286920" y="6381360"/>
+            <a:ext cx="1671840" cy="291240"/>
+          </a:xfrm>
+          <a:prstGeom prst="rect">
+            <a:avLst/>
+          </a:prstGeom>
+          <a:ln>
+            <a:noFill/>
+          </a:ln>
+        </p:spPr>
+      </p:pic>
+      <p:pic>
+        <p:nvPicPr>
+          <p:cNvPr id="65" name="Imagem 64"/>
+          <p:cNvPicPr/>
+          <p:nvPr/>
+        </p:nvPicPr>
+        <p:blipFill>
+          <a:blip r:embed="rId3"/>
+          <a:stretch/>
+        </p:blipFill>
+        <p:spPr>
+          <a:xfrm>
             <a:off x="433800" y="2318040"/>
             <a:ext cx="8456760" cy="2983680"/>
           </a:xfrm>
@@ -4084,24 +4691,57 @@
           </a:ln>
         </p:spPr>
       </p:pic>
+      <p:sp>
+        <p:nvSpPr>
+          <p:cNvPr id="6" name="CaixaDeTexto 5"/>
+          <p:cNvSpPr txBox="1"/>
+          <p:nvPr/>
+        </p:nvSpPr>
+        <p:spPr>
+          <a:xfrm>
+            <a:off x="3334476" y="5693867"/>
+            <a:ext cx="2655407" cy="369332"/>
+          </a:xfrm>
+          <a:prstGeom prst="rect">
+            <a:avLst/>
+          </a:prstGeom>
+          <a:noFill/>
+        </p:spPr>
+        <p:txBody>
+          <a:bodyPr wrap="none" rtlCol="0">
+            <a:spAutoFit/>
+          </a:bodyPr>
+          <a:lstStyle/>
+          <a:p>
+            <a:r>
+              <a:rPr lang="pt-BR" dirty="0" smtClean="0"/>
+              <a:t>Valor de consenso: 4,04</a:t>
+            </a:r>
+            <a:endParaRPr lang="pt-BR" dirty="0"/>
+          </a:p>
+        </p:txBody>
+      </p:sp>
     </p:spTree>
   </p:cSld>
+  <p:clrMapOvr>
+    <a:masterClrMapping/>
+  </p:clrMapOvr>
   <p:timing>
     <p:tnLst>
       <p:par>
-        <p:cTn id="11" dur="indefinite" restart="never" nodeType="tmRoot">
+        <p:cTn id="1" dur="indefinite" restart="never" nodeType="tmRoot">
           <p:childTnLst>
             <p:seq>
-              <p:cTn id="12" dur="indefinite" nodeType="mainSeq"/>
+              <p:cTn id="2" dur="indefinite" nodeType="mainSeq"/>
               <p:prevCondLst>
-                <p:cond delay="0" evt="onPrev">
+                <p:cond evt="onPrev" delay="0">
                   <p:tgtEl>
                     <p:sldTgt/>
                   </p:tgtEl>
                 </p:cond>
               </p:prevCondLst>
               <p:nextCondLst>
-                <p:cond delay="0" evt="onNext">
+                <p:cond evt="onNext" delay="0">
                   <p:tgtEl>
                     <p:sldTgt/>
                   </p:tgtEl>
@@ -4117,7 +4757,7 @@
 </file>
 
 <file path=ppt/slides/slide7.xml><?xml version="1.0" encoding="utf-8"?>
-<p:sld xmlns:a="http://schemas.openxmlformats.org/drawingml/2006/main" xmlns:p="http://schemas.openxmlformats.org/presentationml/2006/main" xmlns:r="http://schemas.openxmlformats.org/officeDocument/2006/relationships" xmlns:p14="http://schemas.microsoft.com/office/powerpoint/2010/main" xmlns:p15="http://schemas.microsoft.com/office/powerpoint/2012/main" xmlns:mc="http://schemas.openxmlformats.org/markup-compatibility/2006">
+<p:sld xmlns:a="http://schemas.openxmlformats.org/drawingml/2006/main" xmlns:r="http://schemas.openxmlformats.org/officeDocument/2006/relationships" xmlns:p="http://schemas.openxmlformats.org/presentationml/2006/main">
   <p:cSld>
     <p:spTree>
       <p:nvGrpSpPr>
@@ -4153,13 +4793,20 @@
           </a:ln>
         </p:spPr>
         <p:style>
-          <a:lnRef idx="0"/>
-          <a:fillRef idx="0"/>
-          <a:effectRef idx="0"/>
+          <a:lnRef idx="0">
+            <a:scrgbClr r="0" g="0" b="0"/>
+          </a:lnRef>
+          <a:fillRef idx="0">
+            <a:scrgbClr r="0" g="0" b="0"/>
+          </a:fillRef>
+          <a:effectRef idx="0">
+            <a:scrgbClr r="0" g="0" b="0"/>
+          </a:effectRef>
           <a:fontRef idx="minor"/>
         </p:style>
         <p:txBody>
-          <a:bodyPr lIns="90000" rIns="90000" tIns="45000" bIns="45000"/>
+          <a:bodyPr lIns="90000" tIns="45000" rIns="90000" bIns="45000"/>
+          <a:lstStyle/>
           <a:p>
             <a:pPr>
               <a:lnSpc>
@@ -4167,7 +4814,7 @@
               </a:lnSpc>
             </a:pPr>
             <a:r>
-              <a:rPr b="1" lang="pt-BR" sz="3600" spc="-1" strike="noStrike">
+              <a:rPr lang="pt-BR" sz="3600" b="1" strike="noStrike" spc="-1">
                 <a:solidFill>
                   <a:srgbClr val="000000"/>
                 </a:solidFill>
@@ -4176,7 +4823,7 @@
               </a:rPr>
               <a:t>Perdi a consciência e não vi o tempo passar enquanto jogava.</a:t>
             </a:r>
-            <a:endParaRPr b="0" lang="pt-BR" sz="3600" spc="-1" strike="noStrike">
+            <a:endParaRPr lang="pt-BR" sz="3600" b="0" strike="noStrike" spc="-1">
               <a:latin typeface="Arial"/>
             </a:endParaRPr>
           </a:p>
@@ -4197,7 +4844,7 @@
             <a:avLst/>
           </a:prstGeom>
           <a:solidFill>
-            <a:srgbClr val="149b55"/>
+            <a:srgbClr val="149B55"/>
           </a:solidFill>
           <a:ln>
             <a:noFill/>
@@ -4220,30 +4867,7 @@
       </p:sp>
       <p:pic>
         <p:nvPicPr>
-          <p:cNvPr id="68" name="Imagem 6" descr=""/>
-          <p:cNvPicPr/>
-          <p:nvPr/>
-        </p:nvPicPr>
-        <p:blipFill>
-          <a:blip r:embed="rId1"/>
-          <a:stretch/>
-        </p:blipFill>
-        <p:spPr>
-          <a:xfrm>
-            <a:off x="286920" y="6381360"/>
-            <a:ext cx="1671840" cy="291240"/>
-          </a:xfrm>
-          <a:prstGeom prst="rect">
-            <a:avLst/>
-          </a:prstGeom>
-          <a:ln>
-            <a:noFill/>
-          </a:ln>
-        </p:spPr>
-      </p:pic>
-      <p:pic>
-        <p:nvPicPr>
-          <p:cNvPr id="69" name="" descr=""/>
+          <p:cNvPr id="68" name="Imagem 6"/>
           <p:cNvPicPr/>
           <p:nvPr/>
         </p:nvPicPr>
@@ -4253,6 +4877,29 @@
         </p:blipFill>
         <p:spPr>
           <a:xfrm>
+            <a:off x="286920" y="6381360"/>
+            <a:ext cx="1671840" cy="291240"/>
+          </a:xfrm>
+          <a:prstGeom prst="rect">
+            <a:avLst/>
+          </a:prstGeom>
+          <a:ln>
+            <a:noFill/>
+          </a:ln>
+        </p:spPr>
+      </p:pic>
+      <p:pic>
+        <p:nvPicPr>
+          <p:cNvPr id="69" name="Imagem 68"/>
+          <p:cNvPicPr/>
+          <p:nvPr/>
+        </p:nvPicPr>
+        <p:blipFill>
+          <a:blip r:embed="rId3"/>
+          <a:stretch/>
+        </p:blipFill>
+        <p:spPr>
+          <a:xfrm>
             <a:off x="478440" y="2248200"/>
             <a:ext cx="8367840" cy="3123360"/>
           </a:xfrm>
@@ -4264,24 +4911,57 @@
           </a:ln>
         </p:spPr>
       </p:pic>
+      <p:sp>
+        <p:nvSpPr>
+          <p:cNvPr id="6" name="CaixaDeTexto 5"/>
+          <p:cNvSpPr txBox="1"/>
+          <p:nvPr/>
+        </p:nvSpPr>
+        <p:spPr>
+          <a:xfrm>
+            <a:off x="3244296" y="5784772"/>
+            <a:ext cx="2655407" cy="369332"/>
+          </a:xfrm>
+          <a:prstGeom prst="rect">
+            <a:avLst/>
+          </a:prstGeom>
+          <a:noFill/>
+        </p:spPr>
+        <p:txBody>
+          <a:bodyPr wrap="none" rtlCol="0">
+            <a:spAutoFit/>
+          </a:bodyPr>
+          <a:lstStyle/>
+          <a:p>
+            <a:r>
+              <a:rPr lang="pt-BR" dirty="0" smtClean="0"/>
+              <a:t>Valor de consenso: 3,18</a:t>
+            </a:r>
+            <a:endParaRPr lang="pt-BR" dirty="0"/>
+          </a:p>
+        </p:txBody>
+      </p:sp>
     </p:spTree>
   </p:cSld>
+  <p:clrMapOvr>
+    <a:masterClrMapping/>
+  </p:clrMapOvr>
   <p:timing>
     <p:tnLst>
       <p:par>
-        <p:cTn id="13" dur="indefinite" restart="never" nodeType="tmRoot">
+        <p:cTn id="1" dur="indefinite" restart="never" nodeType="tmRoot">
           <p:childTnLst>
             <p:seq>
-              <p:cTn id="14" dur="indefinite" nodeType="mainSeq"/>
+              <p:cTn id="2" dur="indefinite" nodeType="mainSeq"/>
               <p:prevCondLst>
-                <p:cond delay="0" evt="onPrev">
+                <p:cond evt="onPrev" delay="0">
                   <p:tgtEl>
                     <p:sldTgt/>
                   </p:tgtEl>
                 </p:cond>
               </p:prevCondLst>
               <p:nextCondLst>
-                <p:cond delay="0" evt="onNext">
+                <p:cond evt="onNext" delay="0">
                   <p:tgtEl>
                     <p:sldTgt/>
                   </p:tgtEl>
@@ -4297,7 +4977,7 @@
 </file>
 
 <file path=ppt/slides/slide8.xml><?xml version="1.0" encoding="utf-8"?>
-<p:sld xmlns:a="http://schemas.openxmlformats.org/drawingml/2006/main" xmlns:p="http://schemas.openxmlformats.org/presentationml/2006/main" xmlns:r="http://schemas.openxmlformats.org/officeDocument/2006/relationships" xmlns:p14="http://schemas.microsoft.com/office/powerpoint/2010/main" xmlns:p15="http://schemas.microsoft.com/office/powerpoint/2012/main" xmlns:mc="http://schemas.openxmlformats.org/markup-compatibility/2006">
+<p:sld xmlns:a="http://schemas.openxmlformats.org/drawingml/2006/main" xmlns:r="http://schemas.openxmlformats.org/officeDocument/2006/relationships" xmlns:p="http://schemas.openxmlformats.org/presentationml/2006/main">
   <p:cSld>
     <p:spTree>
       <p:nvGrpSpPr>
@@ -4333,13 +5013,20 @@
           </a:ln>
         </p:spPr>
         <p:style>
-          <a:lnRef idx="0"/>
-          <a:fillRef idx="0"/>
-          <a:effectRef idx="0"/>
+          <a:lnRef idx="0">
+            <a:scrgbClr r="0" g="0" b="0"/>
+          </a:lnRef>
+          <a:fillRef idx="0">
+            <a:scrgbClr r="0" g="0" b="0"/>
+          </a:fillRef>
+          <a:effectRef idx="0">
+            <a:scrgbClr r="0" g="0" b="0"/>
+          </a:effectRef>
           <a:fontRef idx="minor"/>
         </p:style>
         <p:txBody>
-          <a:bodyPr lIns="90000" rIns="90000" tIns="45000" bIns="45000"/>
+          <a:bodyPr lIns="90000" tIns="45000" rIns="90000" bIns="45000"/>
+          <a:lstStyle/>
           <a:p>
             <a:pPr>
               <a:lnSpc>
@@ -4347,7 +5034,7 @@
               </a:lnSpc>
             </a:pPr>
             <a:r>
-              <a:rPr b="1" lang="pt-BR" sz="3600" spc="-1" strike="noStrike">
+              <a:rPr lang="pt-BR" sz="3600" b="1" strike="noStrike" spc="-1">
                 <a:solidFill>
                   <a:srgbClr val="000000"/>
                 </a:solidFill>
@@ -4356,7 +5043,7 @@
               </a:rPr>
               <a:t>Para mim, aprender o jogo não foi chato ou monótomo, mas sim divertido.</a:t>
             </a:r>
-            <a:endParaRPr b="0" lang="pt-BR" sz="3600" spc="-1" strike="noStrike">
+            <a:endParaRPr lang="pt-BR" sz="3600" b="0" strike="noStrike" spc="-1">
               <a:latin typeface="Arial"/>
             </a:endParaRPr>
           </a:p>
@@ -4377,7 +5064,7 @@
             <a:avLst/>
           </a:prstGeom>
           <a:solidFill>
-            <a:srgbClr val="149b55"/>
+            <a:srgbClr val="149B55"/>
           </a:solidFill>
           <a:ln>
             <a:noFill/>
@@ -4400,30 +5087,7 @@
       </p:sp>
       <p:pic>
         <p:nvPicPr>
-          <p:cNvPr id="72" name="Imagem 6" descr=""/>
-          <p:cNvPicPr/>
-          <p:nvPr/>
-        </p:nvPicPr>
-        <p:blipFill>
-          <a:blip r:embed="rId1"/>
-          <a:stretch/>
-        </p:blipFill>
-        <p:spPr>
-          <a:xfrm>
-            <a:off x="286920" y="6381360"/>
-            <a:ext cx="1671840" cy="291240"/>
-          </a:xfrm>
-          <a:prstGeom prst="rect">
-            <a:avLst/>
-          </a:prstGeom>
-          <a:ln>
-            <a:noFill/>
-          </a:ln>
-        </p:spPr>
-      </p:pic>
-      <p:pic>
-        <p:nvPicPr>
-          <p:cNvPr id="73" name="" descr=""/>
+          <p:cNvPr id="72" name="Imagem 6"/>
           <p:cNvPicPr/>
           <p:nvPr/>
         </p:nvPicPr>
@@ -4433,6 +5097,29 @@
         </p:blipFill>
         <p:spPr>
           <a:xfrm>
+            <a:off x="286920" y="6381360"/>
+            <a:ext cx="1671840" cy="291240"/>
+          </a:xfrm>
+          <a:prstGeom prst="rect">
+            <a:avLst/>
+          </a:prstGeom>
+          <a:ln>
+            <a:noFill/>
+          </a:ln>
+        </p:spPr>
+      </p:pic>
+      <p:pic>
+        <p:nvPicPr>
+          <p:cNvPr id="73" name="Imagem 72"/>
+          <p:cNvPicPr/>
+          <p:nvPr/>
+        </p:nvPicPr>
+        <p:blipFill>
+          <a:blip r:embed="rId3"/>
+          <a:stretch/>
+        </p:blipFill>
+        <p:spPr>
+          <a:xfrm>
             <a:off x="452880" y="2375280"/>
             <a:ext cx="8418600" cy="2869200"/>
           </a:xfrm>
@@ -4444,24 +5131,57 @@
           </a:ln>
         </p:spPr>
       </p:pic>
+      <p:sp>
+        <p:nvSpPr>
+          <p:cNvPr id="6" name="CaixaDeTexto 5"/>
+          <p:cNvSpPr txBox="1"/>
+          <p:nvPr/>
+        </p:nvSpPr>
+        <p:spPr>
+          <a:xfrm>
+            <a:off x="3244296" y="5552589"/>
+            <a:ext cx="2655407" cy="369332"/>
+          </a:xfrm>
+          <a:prstGeom prst="rect">
+            <a:avLst/>
+          </a:prstGeom>
+          <a:noFill/>
+        </p:spPr>
+        <p:txBody>
+          <a:bodyPr wrap="none" rtlCol="0">
+            <a:spAutoFit/>
+          </a:bodyPr>
+          <a:lstStyle/>
+          <a:p>
+            <a:r>
+              <a:rPr lang="pt-BR" dirty="0" smtClean="0"/>
+              <a:t>Valor de consenso: 3,51</a:t>
+            </a:r>
+            <a:endParaRPr lang="pt-BR" dirty="0"/>
+          </a:p>
+        </p:txBody>
+      </p:sp>
     </p:spTree>
   </p:cSld>
+  <p:clrMapOvr>
+    <a:masterClrMapping/>
+  </p:clrMapOvr>
   <p:timing>
     <p:tnLst>
       <p:par>
-        <p:cTn id="15" dur="indefinite" restart="never" nodeType="tmRoot">
+        <p:cTn id="1" dur="indefinite" restart="never" nodeType="tmRoot">
           <p:childTnLst>
             <p:seq>
-              <p:cTn id="16" dur="indefinite" nodeType="mainSeq"/>
+              <p:cTn id="2" dur="indefinite" nodeType="mainSeq"/>
               <p:prevCondLst>
-                <p:cond delay="0" evt="onPrev">
+                <p:cond evt="onPrev" delay="0">
                   <p:tgtEl>
                     <p:sldTgt/>
                   </p:tgtEl>
                 </p:cond>
               </p:prevCondLst>
               <p:nextCondLst>
-                <p:cond delay="0" evt="onNext">
+                <p:cond evt="onNext" delay="0">
                   <p:tgtEl>
                     <p:sldTgt/>
                   </p:tgtEl>
@@ -4477,7 +5197,7 @@
 </file>
 
 <file path=ppt/slides/slide9.xml><?xml version="1.0" encoding="utf-8"?>
-<p:sld xmlns:a="http://schemas.openxmlformats.org/drawingml/2006/main" xmlns:p="http://schemas.openxmlformats.org/presentationml/2006/main" xmlns:r="http://schemas.openxmlformats.org/officeDocument/2006/relationships" xmlns:p14="http://schemas.microsoft.com/office/powerpoint/2010/main" xmlns:p15="http://schemas.microsoft.com/office/powerpoint/2012/main" xmlns:mc="http://schemas.openxmlformats.org/markup-compatibility/2006">
+<p:sld xmlns:a="http://schemas.openxmlformats.org/drawingml/2006/main" xmlns:r="http://schemas.openxmlformats.org/officeDocument/2006/relationships" xmlns:p="http://schemas.openxmlformats.org/presentationml/2006/main">
   <p:cSld>
     <p:spTree>
       <p:nvGrpSpPr>
@@ -4513,13 +5233,20 @@
           </a:ln>
         </p:spPr>
         <p:style>
-          <a:lnRef idx="0"/>
-          <a:fillRef idx="0"/>
-          <a:effectRef idx="0"/>
+          <a:lnRef idx="0">
+            <a:scrgbClr r="0" g="0" b="0"/>
+          </a:lnRef>
+          <a:fillRef idx="0">
+            <a:scrgbClr r="0" g="0" b="0"/>
+          </a:fillRef>
+          <a:effectRef idx="0">
+            <a:scrgbClr r="0" g="0" b="0"/>
+          </a:effectRef>
           <a:fontRef idx="minor"/>
         </p:style>
         <p:txBody>
-          <a:bodyPr lIns="90000" rIns="90000" tIns="45000" bIns="45000"/>
+          <a:bodyPr lIns="90000" tIns="45000" rIns="90000" bIns="45000"/>
+          <a:lstStyle/>
           <a:p>
             <a:pPr>
               <a:lnSpc>
@@ -4527,7 +5254,7 @@
               </a:lnSpc>
             </a:pPr>
             <a:r>
-              <a:rPr b="1" lang="pt-BR" sz="3600" spc="-1" strike="noStrike">
+              <a:rPr lang="pt-BR" sz="3600" b="1" strike="noStrike" spc="-1">
                 <a:solidFill>
                   <a:srgbClr val="000000"/>
                 </a:solidFill>
@@ -4536,7 +5263,7 @@
               </a:rPr>
               <a:t>Todas as fases foram divertidas de jogar.</a:t>
             </a:r>
-            <a:endParaRPr b="0" lang="pt-BR" sz="3600" spc="-1" strike="noStrike">
+            <a:endParaRPr lang="pt-BR" sz="3600" b="0" strike="noStrike" spc="-1">
               <a:latin typeface="Arial"/>
             </a:endParaRPr>
           </a:p>
@@ -4557,7 +5284,7 @@
             <a:avLst/>
           </a:prstGeom>
           <a:solidFill>
-            <a:srgbClr val="149b55"/>
+            <a:srgbClr val="149B55"/>
           </a:solidFill>
           <a:ln>
             <a:noFill/>
@@ -4580,30 +5307,7 @@
       </p:sp>
       <p:pic>
         <p:nvPicPr>
-          <p:cNvPr id="76" name="Imagem 6" descr=""/>
-          <p:cNvPicPr/>
-          <p:nvPr/>
-        </p:nvPicPr>
-        <p:blipFill>
-          <a:blip r:embed="rId1"/>
-          <a:stretch/>
-        </p:blipFill>
-        <p:spPr>
-          <a:xfrm>
-            <a:off x="286920" y="6381360"/>
-            <a:ext cx="1671840" cy="291240"/>
-          </a:xfrm>
-          <a:prstGeom prst="rect">
-            <a:avLst/>
-          </a:prstGeom>
-          <a:ln>
-            <a:noFill/>
-          </a:ln>
-        </p:spPr>
-      </p:pic>
-      <p:pic>
-        <p:nvPicPr>
-          <p:cNvPr id="77" name="" descr=""/>
+          <p:cNvPr id="76" name="Imagem 6"/>
           <p:cNvPicPr/>
           <p:nvPr/>
         </p:nvPicPr>
@@ -4613,6 +5317,29 @@
         </p:blipFill>
         <p:spPr>
           <a:xfrm>
+            <a:off x="286920" y="6381360"/>
+            <a:ext cx="1671840" cy="291240"/>
+          </a:xfrm>
+          <a:prstGeom prst="rect">
+            <a:avLst/>
+          </a:prstGeom>
+          <a:ln>
+            <a:noFill/>
+          </a:ln>
+        </p:spPr>
+      </p:pic>
+      <p:pic>
+        <p:nvPicPr>
+          <p:cNvPr id="77" name="Imagem 76"/>
+          <p:cNvPicPr/>
+          <p:nvPr/>
+        </p:nvPicPr>
+        <p:blipFill>
+          <a:blip r:embed="rId3"/>
+          <a:stretch/>
+        </p:blipFill>
+        <p:spPr>
+          <a:xfrm>
             <a:off x="465840" y="2286360"/>
             <a:ext cx="8393040" cy="3047040"/>
           </a:xfrm>
@@ -4624,24 +5351,57 @@
           </a:ln>
         </p:spPr>
       </p:pic>
+      <p:sp>
+        <p:nvSpPr>
+          <p:cNvPr id="6" name="CaixaDeTexto 5"/>
+          <p:cNvSpPr txBox="1"/>
+          <p:nvPr/>
+        </p:nvSpPr>
+        <p:spPr>
+          <a:xfrm>
+            <a:off x="3244296" y="5672714"/>
+            <a:ext cx="2655407" cy="369332"/>
+          </a:xfrm>
+          <a:prstGeom prst="rect">
+            <a:avLst/>
+          </a:prstGeom>
+          <a:noFill/>
+        </p:spPr>
+        <p:txBody>
+          <a:bodyPr wrap="none" rtlCol="0">
+            <a:spAutoFit/>
+          </a:bodyPr>
+          <a:lstStyle/>
+          <a:p>
+            <a:r>
+              <a:rPr lang="pt-BR" dirty="0" smtClean="0"/>
+              <a:t>Valor de consenso: 3,23</a:t>
+            </a:r>
+            <a:endParaRPr lang="pt-BR" dirty="0"/>
+          </a:p>
+        </p:txBody>
+      </p:sp>
     </p:spTree>
   </p:cSld>
+  <p:clrMapOvr>
+    <a:masterClrMapping/>
+  </p:clrMapOvr>
   <p:timing>
     <p:tnLst>
       <p:par>
-        <p:cTn id="17" dur="indefinite" restart="never" nodeType="tmRoot">
+        <p:cTn id="1" dur="indefinite" restart="never" nodeType="tmRoot">
           <p:childTnLst>
             <p:seq>
-              <p:cTn id="18" dur="indefinite" nodeType="mainSeq"/>
+              <p:cTn id="2" dur="indefinite" nodeType="mainSeq"/>
               <p:prevCondLst>
-                <p:cond delay="0" evt="onPrev">
+                <p:cond evt="onPrev" delay="0">
                   <p:tgtEl>
                     <p:sldTgt/>
                   </p:tgtEl>
                 </p:cond>
               </p:prevCondLst>
               <p:nextCondLst>
-                <p:cond delay="0" evt="onNext">
+                <p:cond evt="onNext" delay="0">
                   <p:tgtEl>
                     <p:sldTgt/>
                   </p:tgtEl>
@@ -4667,31 +5427,31 @@
         <a:sysClr val="window" lastClr="FFFFFF"/>
       </a:lt1>
       <a:dk2>
-        <a:srgbClr val="1f497d"/>
+        <a:srgbClr val="1F497D"/>
       </a:dk2>
       <a:lt2>
-        <a:srgbClr val="eeece1"/>
+        <a:srgbClr val="EEECE1"/>
       </a:lt2>
       <a:accent1>
-        <a:srgbClr val="4f81bd"/>
+        <a:srgbClr val="4F81BD"/>
       </a:accent1>
       <a:accent2>
-        <a:srgbClr val="c0504d"/>
+        <a:srgbClr val="C0504D"/>
       </a:accent2>
       <a:accent3>
-        <a:srgbClr val="9bbb59"/>
+        <a:srgbClr val="9BBB59"/>
       </a:accent3>
       <a:accent4>
-        <a:srgbClr val="8064a2"/>
+        <a:srgbClr val="8064A2"/>
       </a:accent4>
       <a:accent5>
-        <a:srgbClr val="4bacc6"/>
+        <a:srgbClr val="4BACC6"/>
       </a:accent5>
       <a:accent6>
-        <a:srgbClr val="f79646"/>
+        <a:srgbClr val="F79646"/>
       </a:accent6>
       <a:hlink>
-        <a:srgbClr val="0000ff"/>
+        <a:srgbClr val="0000FF"/>
       </a:hlink>
       <a:folHlink>
         <a:srgbClr val="800080"/>
@@ -4876,5 +5636,7 @@
       </a:bgFillStyleLst>
     </a:fmtScheme>
   </a:themeElements>
+  <a:objectDefaults/>
+  <a:extraClrSchemeLst/>
 </a:theme>
 </file>
</xml_diff>